<commit_message>
added pressure sensor into setup drawing
</commit_message>
<xml_diff>
--- a/HRS Setup.pptx
+++ b/HRS Setup.pptx
@@ -3336,7 +3336,7 @@
         </p:nvSpPr>
         <p:spPr>
           <a:xfrm>
-            <a:off x="1450501" y="4056830"/>
+            <a:off x="1450501" y="4204314"/>
             <a:ext cx="1577009" cy="646331"/>
           </a:xfrm>
           <a:prstGeom prst="rect">
@@ -3391,7 +3391,7 @@
         </p:nvSpPr>
         <p:spPr>
           <a:xfrm>
-            <a:off x="1406601" y="5395699"/>
+            <a:off x="1406601" y="5543183"/>
             <a:ext cx="1664806" cy="646331"/>
           </a:xfrm>
           <a:prstGeom prst="rect">
@@ -3590,7 +3590,7 @@
         <p:spPr>
           <a:xfrm flipH="1">
             <a:off x="2239006" y="2174658"/>
-            <a:ext cx="1" cy="1882172"/>
+            <a:ext cx="1" cy="2029656"/>
           </a:xfrm>
           <a:prstGeom prst="straightConnector1">
             <a:avLst/>
@@ -3626,7 +3626,7 @@
         </p:nvCxnSpPr>
         <p:spPr>
           <a:xfrm>
-            <a:off x="2239004" y="3761358"/>
+            <a:off x="2239004" y="3955142"/>
             <a:ext cx="1215306" cy="0"/>
           </a:xfrm>
           <a:prstGeom prst="straightConnector1">
@@ -3663,8 +3663,8 @@
         </p:nvSpPr>
         <p:spPr>
           <a:xfrm>
-            <a:off x="3802957" y="3421336"/>
-            <a:ext cx="1843200" cy="461665"/>
+            <a:off x="3762058" y="2854699"/>
+            <a:ext cx="1884099" cy="461665"/>
           </a:xfrm>
           <a:prstGeom prst="rect">
             <a:avLst/>
@@ -3838,7 +3838,7 @@
         </p:nvCxnSpPr>
         <p:spPr>
           <a:xfrm flipH="1">
-            <a:off x="2239004" y="4703161"/>
+            <a:off x="2239004" y="4850645"/>
             <a:ext cx="2" cy="692538"/>
           </a:xfrm>
           <a:prstGeom prst="straightConnector1">
@@ -3875,7 +3875,7 @@
         </p:nvSpPr>
         <p:spPr>
           <a:xfrm>
-            <a:off x="2344560" y="3396405"/>
+            <a:off x="2344560" y="3590189"/>
             <a:ext cx="995785" cy="307777"/>
           </a:xfrm>
           <a:prstGeom prst="rect">
@@ -6308,8 +6308,8 @@
         </p:nvSpPr>
         <p:spPr>
           <a:xfrm>
-            <a:off x="5647363" y="3630187"/>
-            <a:ext cx="5214878" cy="2335215"/>
+            <a:off x="5646157" y="3085383"/>
+            <a:ext cx="5216084" cy="2880019"/>
           </a:xfrm>
           <a:custGeom>
             <a:avLst/>
@@ -6474,6 +6474,66 @@
               <a:gd name="connsiteY3" fmla="*/ 2536700 h 2536700"/>
               <a:gd name="connsiteX4" fmla="*/ 5546434 w 5546434"/>
               <a:gd name="connsiteY4" fmla="*/ 2197848 h 2536700"/>
+              <a:gd name="connsiteX0" fmla="*/ 0 w 5546434"/>
+              <a:gd name="connsiteY0" fmla="*/ 0 h 2532533"/>
+              <a:gd name="connsiteX1" fmla="*/ 279927 w 5546434"/>
+              <a:gd name="connsiteY1" fmla="*/ 6748 h 2532533"/>
+              <a:gd name="connsiteX2" fmla="*/ 188804 w 5546434"/>
+              <a:gd name="connsiteY2" fmla="*/ 2528777 h 2532533"/>
+              <a:gd name="connsiteX3" fmla="*/ 5546434 w 5546434"/>
+              <a:gd name="connsiteY3" fmla="*/ 2532533 h 2532533"/>
+              <a:gd name="connsiteX4" fmla="*/ 5546434 w 5546434"/>
+              <a:gd name="connsiteY4" fmla="*/ 2193681 h 2532533"/>
+              <a:gd name="connsiteX0" fmla="*/ 0 w 5546434"/>
+              <a:gd name="connsiteY0" fmla="*/ 0 h 2550608"/>
+              <a:gd name="connsiteX1" fmla="*/ 279927 w 5546434"/>
+              <a:gd name="connsiteY1" fmla="*/ 6748 h 2550608"/>
+              <a:gd name="connsiteX2" fmla="*/ 274282 w 5546434"/>
+              <a:gd name="connsiteY2" fmla="*/ 2550608 h 2550608"/>
+              <a:gd name="connsiteX3" fmla="*/ 5546434 w 5546434"/>
+              <a:gd name="connsiteY3" fmla="*/ 2532533 h 2550608"/>
+              <a:gd name="connsiteX4" fmla="*/ 5546434 w 5546434"/>
+              <a:gd name="connsiteY4" fmla="*/ 2193681 h 2550608"/>
+              <a:gd name="connsiteX0" fmla="*/ 0 w 5546434"/>
+              <a:gd name="connsiteY0" fmla="*/ 0 h 2532533"/>
+              <a:gd name="connsiteX1" fmla="*/ 279927 w 5546434"/>
+              <a:gd name="connsiteY1" fmla="*/ 6748 h 2532533"/>
+              <a:gd name="connsiteX2" fmla="*/ 274282 w 5546434"/>
+              <a:gd name="connsiteY2" fmla="*/ 2517861 h 2532533"/>
+              <a:gd name="connsiteX3" fmla="*/ 5546434 w 5546434"/>
+              <a:gd name="connsiteY3" fmla="*/ 2532533 h 2532533"/>
+              <a:gd name="connsiteX4" fmla="*/ 5546434 w 5546434"/>
+              <a:gd name="connsiteY4" fmla="*/ 2193681 h 2532533"/>
+              <a:gd name="connsiteX0" fmla="*/ 0 w 5546434"/>
+              <a:gd name="connsiteY0" fmla="*/ 0 h 2532533"/>
+              <a:gd name="connsiteX1" fmla="*/ 279927 w 5546434"/>
+              <a:gd name="connsiteY1" fmla="*/ 299 h 2532533"/>
+              <a:gd name="connsiteX2" fmla="*/ 274282 w 5546434"/>
+              <a:gd name="connsiteY2" fmla="*/ 2517861 h 2532533"/>
+              <a:gd name="connsiteX3" fmla="*/ 5546434 w 5546434"/>
+              <a:gd name="connsiteY3" fmla="*/ 2532533 h 2532533"/>
+              <a:gd name="connsiteX4" fmla="*/ 5546434 w 5546434"/>
+              <a:gd name="connsiteY4" fmla="*/ 2193681 h 2532533"/>
+              <a:gd name="connsiteX0" fmla="*/ 0 w 5546434"/>
+              <a:gd name="connsiteY0" fmla="*/ 0 h 3128510"/>
+              <a:gd name="connsiteX1" fmla="*/ 279927 w 5546434"/>
+              <a:gd name="connsiteY1" fmla="*/ 596276 h 3128510"/>
+              <a:gd name="connsiteX2" fmla="*/ 274282 w 5546434"/>
+              <a:gd name="connsiteY2" fmla="*/ 3113838 h 3128510"/>
+              <a:gd name="connsiteX3" fmla="*/ 5546434 w 5546434"/>
+              <a:gd name="connsiteY3" fmla="*/ 3128510 h 3128510"/>
+              <a:gd name="connsiteX4" fmla="*/ 5546434 w 5546434"/>
+              <a:gd name="connsiteY4" fmla="*/ 2789658 h 3128510"/>
+              <a:gd name="connsiteX0" fmla="*/ 0 w 5546434"/>
+              <a:gd name="connsiteY0" fmla="*/ 0 h 3128510"/>
+              <a:gd name="connsiteX1" fmla="*/ 286200 w 5546434"/>
+              <a:gd name="connsiteY1" fmla="*/ 299 h 3128510"/>
+              <a:gd name="connsiteX2" fmla="*/ 274282 w 5546434"/>
+              <a:gd name="connsiteY2" fmla="*/ 3113838 h 3128510"/>
+              <a:gd name="connsiteX3" fmla="*/ 5546434 w 5546434"/>
+              <a:gd name="connsiteY3" fmla="*/ 3128510 h 3128510"/>
+              <a:gd name="connsiteX4" fmla="*/ 5546434 w 5546434"/>
+              <a:gd name="connsiteY4" fmla="*/ 2789658 h 3128510"/>
             </a:gdLst>
             <a:ahLst/>
             <a:cxnLst>
@@ -6495,21 +6555,23 @@
             </a:cxnLst>
             <a:rect l="l" t="t" r="r" b="b"/>
             <a:pathLst>
-              <a:path w="5546434" h="2536700">
+              <a:path w="5546434" h="3128510">
                 <a:moveTo>
-                  <a:pt x="0" y="4167"/>
+                  <a:pt x="0" y="0"/>
                 </a:moveTo>
                 <a:lnTo>
-                  <a:pt x="205133" y="0"/>
+                  <a:pt x="286200" y="299"/>
+                </a:lnTo>
+                <a:cubicBezTo>
+                  <a:pt x="284318" y="848252"/>
+                  <a:pt x="276164" y="2265885"/>
+                  <a:pt x="274282" y="3113838"/>
+                </a:cubicBezTo>
+                <a:lnTo>
+                  <a:pt x="5546434" y="3128510"/>
                 </a:lnTo>
                 <a:lnTo>
-                  <a:pt x="188804" y="2532944"/>
-                </a:lnTo>
-                <a:lnTo>
-                  <a:pt x="5546434" y="2536700"/>
-                </a:lnTo>
-                <a:lnTo>
-                  <a:pt x="5546434" y="2197848"/>
+                  <a:pt x="5546434" y="2789658"/>
                 </a:lnTo>
               </a:path>
             </a:pathLst>
@@ -6943,8 +7005,8 @@
         </p:nvSpPr>
         <p:spPr>
           <a:xfrm>
-            <a:off x="3068828" y="3633145"/>
-            <a:ext cx="737695" cy="2110231"/>
+            <a:off x="3068827" y="3107853"/>
+            <a:ext cx="704805" cy="2755027"/>
           </a:xfrm>
           <a:custGeom>
             <a:avLst/>
@@ -6967,6 +7029,38 @@
               <a:gd name="connsiteY2" fmla="*/ 0 h 1775012"/>
               <a:gd name="connsiteX3" fmla="*/ 770965 w 770965"/>
               <a:gd name="connsiteY3" fmla="*/ 0 h 1775012"/>
+              <a:gd name="connsiteX0" fmla="*/ 0 w 719092"/>
+              <a:gd name="connsiteY0" fmla="*/ 1775012 h 1775012"/>
+              <a:gd name="connsiteX1" fmla="*/ 412377 w 719092"/>
+              <a:gd name="connsiteY1" fmla="*/ 1775012 h 1775012"/>
+              <a:gd name="connsiteX2" fmla="*/ 403412 w 719092"/>
+              <a:gd name="connsiteY2" fmla="*/ 0 h 1775012"/>
+              <a:gd name="connsiteX3" fmla="*/ 719092 w 719092"/>
+              <a:gd name="connsiteY3" fmla="*/ 6009 h 1775012"/>
+              <a:gd name="connsiteX0" fmla="*/ 0 w 731098"/>
+              <a:gd name="connsiteY0" fmla="*/ 2216858 h 2216858"/>
+              <a:gd name="connsiteX1" fmla="*/ 412377 w 731098"/>
+              <a:gd name="connsiteY1" fmla="*/ 2216858 h 2216858"/>
+              <a:gd name="connsiteX2" fmla="*/ 403412 w 731098"/>
+              <a:gd name="connsiteY2" fmla="*/ 441846 h 2216858"/>
+              <a:gd name="connsiteX3" fmla="*/ 731098 w 731098"/>
+              <a:gd name="connsiteY3" fmla="*/ 0 h 2216858"/>
+              <a:gd name="connsiteX0" fmla="*/ 0 w 731098"/>
+              <a:gd name="connsiteY0" fmla="*/ 2221611 h 2221611"/>
+              <a:gd name="connsiteX1" fmla="*/ 412377 w 731098"/>
+              <a:gd name="connsiteY1" fmla="*/ 2221611 h 2221611"/>
+              <a:gd name="connsiteX2" fmla="*/ 403412 w 731098"/>
+              <a:gd name="connsiteY2" fmla="*/ 0 h 2221611"/>
+              <a:gd name="connsiteX3" fmla="*/ 731098 w 731098"/>
+              <a:gd name="connsiteY3" fmla="*/ 4753 h 2221611"/>
+              <a:gd name="connsiteX0" fmla="*/ 0 w 731098"/>
+              <a:gd name="connsiteY0" fmla="*/ 2216858 h 2216858"/>
+              <a:gd name="connsiteX1" fmla="*/ 412377 w 731098"/>
+              <a:gd name="connsiteY1" fmla="*/ 2216858 h 2216858"/>
+              <a:gd name="connsiteX2" fmla="*/ 403412 w 731098"/>
+              <a:gd name="connsiteY2" fmla="*/ 210 h 2216858"/>
+              <a:gd name="connsiteX3" fmla="*/ 731098 w 731098"/>
+              <a:gd name="connsiteY3" fmla="*/ 0 h 2216858"/>
             </a:gdLst>
             <a:ahLst/>
             <a:cxnLst>
@@ -6985,20 +7079,20 @@
             </a:cxnLst>
             <a:rect l="l" t="t" r="r" b="b"/>
             <a:pathLst>
-              <a:path w="770965" h="1775012">
+              <a:path w="731098" h="2216858">
                 <a:moveTo>
-                  <a:pt x="0" y="1775012"/>
+                  <a:pt x="0" y="2216858"/>
                 </a:moveTo>
                 <a:lnTo>
-                  <a:pt x="412377" y="1775012"/>
+                  <a:pt x="412377" y="2216858"/>
                 </a:lnTo>
                 <a:cubicBezTo>
-                  <a:pt x="409389" y="1183341"/>
-                  <a:pt x="406400" y="591671"/>
-                  <a:pt x="403412" y="0"/>
+                  <a:pt x="409389" y="1625187"/>
+                  <a:pt x="406400" y="591881"/>
+                  <a:pt x="403412" y="210"/>
                 </a:cubicBezTo>
                 <a:lnTo>
-                  <a:pt x="770965" y="0"/>
+                  <a:pt x="731098" y="0"/>
                 </a:lnTo>
               </a:path>
             </a:pathLst>
@@ -7044,7 +7138,7 @@
         </p:nvCxnSpPr>
         <p:spPr>
           <a:xfrm>
-            <a:off x="2249087" y="5106002"/>
+            <a:off x="2249087" y="5253486"/>
             <a:ext cx="1215306" cy="0"/>
           </a:xfrm>
           <a:prstGeom prst="straightConnector1">
@@ -7081,7 +7175,7 @@
         </p:nvSpPr>
         <p:spPr>
           <a:xfrm>
-            <a:off x="2353669" y="4741652"/>
+            <a:off x="2353669" y="4889136"/>
             <a:ext cx="995785" cy="307777"/>
           </a:xfrm>
           <a:prstGeom prst="rect">
@@ -7221,6 +7315,130 @@
               <a:schemeClr val="tx1"/>
             </a:solidFill>
             <a:tailEnd type="triangle" w="lg" len="lg"/>
+          </a:ln>
+        </p:spPr>
+        <p:style>
+          <a:lnRef idx="1">
+            <a:schemeClr val="accent1"/>
+          </a:lnRef>
+          <a:fillRef idx="0">
+            <a:schemeClr val="accent1"/>
+          </a:fillRef>
+          <a:effectRef idx="0">
+            <a:schemeClr val="accent1"/>
+          </a:effectRef>
+          <a:fontRef idx="minor">
+            <a:schemeClr val="tx1"/>
+          </a:fontRef>
+        </p:style>
+      </p:cxnSp>
+      <p:sp>
+        <p:nvSpPr>
+          <p:cNvPr id="177" name="TextBox 176"/>
+          <p:cNvSpPr txBox="1"/>
+          <p:nvPr/>
+        </p:nvSpPr>
+        <p:spPr>
+          <a:xfrm>
+            <a:off x="3623063" y="3455929"/>
+            <a:ext cx="2116108" cy="369332"/>
+          </a:xfrm>
+          <a:prstGeom prst="rect">
+            <a:avLst/>
+          </a:prstGeom>
+        </p:spPr>
+        <p:style>
+          <a:lnRef idx="2">
+            <a:schemeClr val="dk1"/>
+          </a:lnRef>
+          <a:fillRef idx="1">
+            <a:schemeClr val="lt1"/>
+          </a:fillRef>
+          <a:effectRef idx="0">
+            <a:schemeClr val="dk1"/>
+          </a:effectRef>
+          <a:fontRef idx="minor">
+            <a:schemeClr val="dk1"/>
+          </a:fontRef>
+        </p:style>
+        <p:txBody>
+          <a:bodyPr wrap="square" rtlCol="0">
+            <a:spAutoFit/>
+          </a:bodyPr>
+          <a:lstStyle/>
+          <a:p>
+            <a:pPr algn="ctr"/>
+            <a:r>
+              <a:rPr lang="en-US" dirty="0" smtClean="0">
+                <a:latin typeface="Verdana" charset="0"/>
+                <a:ea typeface="Verdana" charset="0"/>
+                <a:cs typeface="Verdana" charset="0"/>
+              </a:rPr>
+              <a:t>Pressure Sensor</a:t>
+            </a:r>
+            <a:endParaRPr lang="en-US" dirty="0">
+              <a:latin typeface="Verdana" charset="0"/>
+              <a:ea typeface="Verdana" charset="0"/>
+              <a:cs typeface="Verdana" charset="0"/>
+            </a:endParaRPr>
+          </a:p>
+        </p:txBody>
+      </p:sp>
+      <p:cxnSp>
+        <p:nvCxnSpPr>
+          <p:cNvPr id="179" name="Straight Connector 178"/>
+          <p:cNvCxnSpPr>
+            <a:endCxn id="177" idx="1"/>
+          </p:cNvCxnSpPr>
+          <p:nvPr/>
+        </p:nvCxnSpPr>
+        <p:spPr>
+          <a:xfrm>
+            <a:off x="3464393" y="3640595"/>
+            <a:ext cx="158670" cy="0"/>
+          </a:xfrm>
+          <a:prstGeom prst="line">
+            <a:avLst/>
+          </a:prstGeom>
+          <a:ln w="28575">
+            <a:solidFill>
+              <a:schemeClr val="tx1"/>
+            </a:solidFill>
+          </a:ln>
+        </p:spPr>
+        <p:style>
+          <a:lnRef idx="1">
+            <a:schemeClr val="accent1"/>
+          </a:lnRef>
+          <a:fillRef idx="0">
+            <a:schemeClr val="accent1"/>
+          </a:fillRef>
+          <a:effectRef idx="0">
+            <a:schemeClr val="accent1"/>
+          </a:effectRef>
+          <a:fontRef idx="minor">
+            <a:schemeClr val="tx1"/>
+          </a:fontRef>
+        </p:style>
+      </p:cxnSp>
+      <p:cxnSp>
+        <p:nvCxnSpPr>
+          <p:cNvPr id="181" name="Straight Connector 180"/>
+          <p:cNvCxnSpPr/>
+          <p:nvPr/>
+        </p:nvCxnSpPr>
+        <p:spPr>
+          <a:xfrm>
+            <a:off x="5744584" y="3640595"/>
+            <a:ext cx="175992" cy="0"/>
+          </a:xfrm>
+          <a:prstGeom prst="line">
+            <a:avLst/>
+          </a:prstGeom>
+          <a:ln w="28575">
+            <a:solidFill>
+              <a:schemeClr val="tx1"/>
+            </a:solidFill>
           </a:ln>
         </p:spPr>
         <p:style>

</xml_diff>

<commit_message>
added clay and coag tubes and another bypass
</commit_message>
<xml_diff>
--- a/HRS Setup.pptx
+++ b/HRS Setup.pptx
@@ -2972,7 +2972,7 @@
         </p:nvSpPr>
         <p:spPr>
           <a:xfrm>
-            <a:off x="1669163" y="1343661"/>
+            <a:off x="1799789" y="1343661"/>
             <a:ext cx="1139687" cy="830997"/>
           </a:xfrm>
           <a:prstGeom prst="rect">
@@ -3024,7 +3024,7 @@
         </p:nvSpPr>
         <p:spPr>
           <a:xfrm>
-            <a:off x="4963120" y="1343660"/>
+            <a:off x="3892684" y="1344744"/>
             <a:ext cx="1775791" cy="830997"/>
           </a:xfrm>
           <a:prstGeom prst="rect">
@@ -3076,7 +3076,7 @@
         </p:nvSpPr>
         <p:spPr>
           <a:xfrm>
-            <a:off x="6448699" y="2475713"/>
+            <a:off x="6555651" y="1346321"/>
             <a:ext cx="1139687" cy="830997"/>
           </a:xfrm>
           <a:prstGeom prst="rect">
@@ -3128,7 +3128,7 @@
         </p:nvSpPr>
         <p:spPr>
           <a:xfrm>
-            <a:off x="1669162" y="304472"/>
+            <a:off x="1799788" y="304472"/>
             <a:ext cx="1139687" cy="707886"/>
           </a:xfrm>
           <a:prstGeom prst="rect">
@@ -3180,7 +3180,7 @@
         </p:nvSpPr>
         <p:spPr>
           <a:xfrm>
-            <a:off x="5074105" y="309976"/>
+            <a:off x="4003669" y="311060"/>
             <a:ext cx="1553819" cy="707886"/>
           </a:xfrm>
           <a:prstGeom prst="rect">
@@ -3232,7 +3232,7 @@
         </p:nvSpPr>
         <p:spPr>
           <a:xfrm>
-            <a:off x="3314898" y="1344158"/>
+            <a:off x="314913" y="1333278"/>
             <a:ext cx="1139687" cy="830997"/>
           </a:xfrm>
           <a:prstGeom prst="rect">
@@ -3284,7 +3284,7 @@
         </p:nvSpPr>
         <p:spPr>
           <a:xfrm>
-            <a:off x="3208860" y="304472"/>
+            <a:off x="207217" y="311060"/>
             <a:ext cx="1346754" cy="707886"/>
           </a:xfrm>
           <a:prstGeom prst="rect">
@@ -3336,7 +3336,7 @@
         </p:nvSpPr>
         <p:spPr>
           <a:xfrm>
-            <a:off x="1450501" y="4204314"/>
+            <a:off x="1581127" y="4204314"/>
             <a:ext cx="1577009" cy="646331"/>
           </a:xfrm>
           <a:prstGeom prst="rect">
@@ -3391,7 +3391,7 @@
         </p:nvSpPr>
         <p:spPr>
           <a:xfrm>
-            <a:off x="1406601" y="5543183"/>
+            <a:off x="1537227" y="5761551"/>
             <a:ext cx="1664806" cy="646331"/>
           </a:xfrm>
           <a:prstGeom prst="rect">
@@ -3443,7 +3443,7 @@
         </p:nvSpPr>
         <p:spPr>
           <a:xfrm>
-            <a:off x="7239209" y="304472"/>
+            <a:off x="7369835" y="304472"/>
             <a:ext cx="1139687" cy="707886"/>
           </a:xfrm>
           <a:prstGeom prst="rect">
@@ -3495,7 +3495,7 @@
         </p:nvSpPr>
         <p:spPr>
           <a:xfrm>
-            <a:off x="6976649" y="4548463"/>
+            <a:off x="7145912" y="4548463"/>
             <a:ext cx="1664806" cy="646331"/>
           </a:xfrm>
           <a:prstGeom prst="rect">
@@ -3550,7 +3550,7 @@
         </p:nvCxnSpPr>
         <p:spPr>
           <a:xfrm>
-            <a:off x="2239006" y="1012358"/>
+            <a:off x="2369632" y="1012358"/>
             <a:ext cx="1" cy="331303"/>
           </a:xfrm>
           <a:prstGeom prst="straightConnector1">
@@ -3589,7 +3589,7 @@
         </p:nvCxnSpPr>
         <p:spPr>
           <a:xfrm flipH="1">
-            <a:off x="2239006" y="2174658"/>
+            <a:off x="2369632" y="2174658"/>
             <a:ext cx="1" cy="2029656"/>
           </a:xfrm>
           <a:prstGeom prst="straightConnector1">
@@ -3626,7 +3626,7 @@
         </p:nvCxnSpPr>
         <p:spPr>
           <a:xfrm>
-            <a:off x="2239004" y="3955142"/>
+            <a:off x="2369630" y="3955142"/>
             <a:ext cx="1215306" cy="0"/>
           </a:xfrm>
           <a:prstGeom prst="straightConnector1">
@@ -3663,7 +3663,7 @@
         </p:nvSpPr>
         <p:spPr>
           <a:xfrm>
-            <a:off x="3762058" y="2854699"/>
+            <a:off x="3892684" y="2837819"/>
             <a:ext cx="1884099" cy="461665"/>
           </a:xfrm>
           <a:prstGeom prst="rect">
@@ -3721,8 +3721,8 @@
         </p:nvCxnSpPr>
         <p:spPr>
           <a:xfrm>
-            <a:off x="3882237" y="1012358"/>
-            <a:ext cx="2505" cy="331800"/>
+            <a:off x="880594" y="1018946"/>
+            <a:ext cx="4163" cy="314332"/>
           </a:xfrm>
           <a:prstGeom prst="straightConnector1">
             <a:avLst/>
@@ -3760,7 +3760,7 @@
         </p:nvCxnSpPr>
         <p:spPr>
           <a:xfrm>
-            <a:off x="5851015" y="1017862"/>
+            <a:off x="4780579" y="1018946"/>
             <a:ext cx="1" cy="325798"/>
           </a:xfrm>
           <a:prstGeom prst="straightConnector1">
@@ -3798,9 +3798,9 @@
           <p:nvPr/>
         </p:nvCxnSpPr>
         <p:spPr>
-          <a:xfrm flipV="1">
-            <a:off x="7809052" y="1012358"/>
-            <a:ext cx="1" cy="3536105"/>
+          <a:xfrm flipH="1" flipV="1">
+            <a:off x="7939679" y="1012358"/>
+            <a:ext cx="38636" cy="3536105"/>
           </a:xfrm>
           <a:prstGeom prst="straightConnector1">
             <a:avLst/>
@@ -3838,8 +3838,8 @@
         </p:nvCxnSpPr>
         <p:spPr>
           <a:xfrm flipH="1">
-            <a:off x="2239004" y="4850645"/>
-            <a:ext cx="2" cy="692538"/>
+            <a:off x="2369630" y="4850645"/>
+            <a:ext cx="2" cy="910906"/>
           </a:xfrm>
           <a:prstGeom prst="straightConnector1">
             <a:avLst/>
@@ -3875,7 +3875,7 @@
         </p:nvSpPr>
         <p:spPr>
           <a:xfrm>
-            <a:off x="2344560" y="3590189"/>
+            <a:off x="2475186" y="3590189"/>
             <a:ext cx="995785" cy="307777"/>
           </a:xfrm>
           <a:prstGeom prst="rect">
@@ -3913,7 +3913,7 @@
         </p:nvGrpSpPr>
         <p:grpSpPr>
           <a:xfrm>
-            <a:off x="9086149" y="1511989"/>
+            <a:off x="9216775" y="1511989"/>
             <a:ext cx="2057210" cy="4163130"/>
             <a:chOff x="8774629" y="1091020"/>
             <a:chExt cx="2057210" cy="5167017"/>
@@ -5993,8 +5993,8 @@
         </p:nvSpPr>
         <p:spPr>
           <a:xfrm>
-            <a:off x="8629080" y="1338511"/>
-            <a:ext cx="778877" cy="3566910"/>
+            <a:off x="8810718" y="1338511"/>
+            <a:ext cx="727865" cy="3566910"/>
           </a:xfrm>
           <a:custGeom>
             <a:avLst/>
@@ -6308,8 +6308,8 @@
         </p:nvSpPr>
         <p:spPr>
           <a:xfrm>
-            <a:off x="5646157" y="3085383"/>
-            <a:ext cx="5216084" cy="2880019"/>
+            <a:off x="5776783" y="3053984"/>
+            <a:ext cx="5216084" cy="2911418"/>
           </a:xfrm>
           <a:custGeom>
             <a:avLst/>
@@ -6534,6 +6534,36 @@
               <a:gd name="connsiteY3" fmla="*/ 3128510 h 3128510"/>
               <a:gd name="connsiteX4" fmla="*/ 5546434 w 5546434"/>
               <a:gd name="connsiteY4" fmla="*/ 2789658 h 3128510"/>
+              <a:gd name="connsiteX0" fmla="*/ 0 w 5546434"/>
+              <a:gd name="connsiteY0" fmla="*/ 0 h 3239924"/>
+              <a:gd name="connsiteX1" fmla="*/ 286200 w 5546434"/>
+              <a:gd name="connsiteY1" fmla="*/ 111713 h 3239924"/>
+              <a:gd name="connsiteX2" fmla="*/ 274282 w 5546434"/>
+              <a:gd name="connsiteY2" fmla="*/ 3225252 h 3239924"/>
+              <a:gd name="connsiteX3" fmla="*/ 5546434 w 5546434"/>
+              <a:gd name="connsiteY3" fmla="*/ 3239924 h 3239924"/>
+              <a:gd name="connsiteX4" fmla="*/ 5546434 w 5546434"/>
+              <a:gd name="connsiteY4" fmla="*/ 2901072 h 3239924"/>
+              <a:gd name="connsiteX0" fmla="*/ 0 w 5546434"/>
+              <a:gd name="connsiteY0" fmla="*/ 0 h 3239924"/>
+              <a:gd name="connsiteX1" fmla="*/ 286200 w 5546434"/>
+              <a:gd name="connsiteY1" fmla="*/ 22583 h 3239924"/>
+              <a:gd name="connsiteX2" fmla="*/ 274282 w 5546434"/>
+              <a:gd name="connsiteY2" fmla="*/ 3225252 h 3239924"/>
+              <a:gd name="connsiteX3" fmla="*/ 5546434 w 5546434"/>
+              <a:gd name="connsiteY3" fmla="*/ 3239924 h 3239924"/>
+              <a:gd name="connsiteX4" fmla="*/ 5546434 w 5546434"/>
+              <a:gd name="connsiteY4" fmla="*/ 2901072 h 3239924"/>
+              <a:gd name="connsiteX0" fmla="*/ 0 w 5546434"/>
+              <a:gd name="connsiteY0" fmla="*/ 0 h 3239924"/>
+              <a:gd name="connsiteX1" fmla="*/ 286200 w 5546434"/>
+              <a:gd name="connsiteY1" fmla="*/ 300 h 3239924"/>
+              <a:gd name="connsiteX2" fmla="*/ 274282 w 5546434"/>
+              <a:gd name="connsiteY2" fmla="*/ 3225252 h 3239924"/>
+              <a:gd name="connsiteX3" fmla="*/ 5546434 w 5546434"/>
+              <a:gd name="connsiteY3" fmla="*/ 3239924 h 3239924"/>
+              <a:gd name="connsiteX4" fmla="*/ 5546434 w 5546434"/>
+              <a:gd name="connsiteY4" fmla="*/ 2901072 h 3239924"/>
             </a:gdLst>
             <a:ahLst/>
             <a:cxnLst>
@@ -6555,23 +6585,23 @@
             </a:cxnLst>
             <a:rect l="l" t="t" r="r" b="b"/>
             <a:pathLst>
-              <a:path w="5546434" h="3128510">
+              <a:path w="5546434" h="3239924">
                 <a:moveTo>
                   <a:pt x="0" y="0"/>
                 </a:moveTo>
                 <a:lnTo>
-                  <a:pt x="286200" y="299"/>
+                  <a:pt x="286200" y="300"/>
                 </a:lnTo>
                 <a:cubicBezTo>
-                  <a:pt x="284318" y="848252"/>
-                  <a:pt x="276164" y="2265885"/>
-                  <a:pt x="274282" y="3113838"/>
+                  <a:pt x="284318" y="848253"/>
+                  <a:pt x="276164" y="2377299"/>
+                  <a:pt x="274282" y="3225252"/>
                 </a:cubicBezTo>
                 <a:lnTo>
-                  <a:pt x="5546434" y="3128510"/>
+                  <a:pt x="5546434" y="3239924"/>
                 </a:lnTo>
                 <a:lnTo>
-                  <a:pt x="5546434" y="2789658"/>
+                  <a:pt x="5546434" y="2901072"/>
                 </a:lnTo>
               </a:path>
             </a:pathLst>
@@ -6617,8 +6647,8 @@
         </p:nvSpPr>
         <p:spPr>
           <a:xfrm>
-            <a:off x="6172162" y="2858165"/>
-            <a:ext cx="3177730" cy="2605729"/>
+            <a:off x="6302788" y="1759159"/>
+            <a:ext cx="3181180" cy="3704735"/>
           </a:xfrm>
           <a:custGeom>
             <a:avLst/>
@@ -6847,6 +6877,48 @@
               <a:gd name="connsiteY3" fmla="*/ 4027 h 2497156"/>
               <a:gd name="connsiteX4" fmla="*/ 256884 w 2876550"/>
               <a:gd name="connsiteY4" fmla="*/ 0 h 2497156"/>
+              <a:gd name="connsiteX0" fmla="*/ 2876550 w 2876550"/>
+              <a:gd name="connsiteY0" fmla="*/ 1316056 h 2497156"/>
+              <a:gd name="connsiteX1" fmla="*/ 2869062 w 2876550"/>
+              <a:gd name="connsiteY1" fmla="*/ 1666826 h 2497156"/>
+              <a:gd name="connsiteX2" fmla="*/ 2876550 w 2876550"/>
+              <a:gd name="connsiteY2" fmla="*/ 2497156 h 2497156"/>
+              <a:gd name="connsiteX3" fmla="*/ 0 w 2876550"/>
+              <a:gd name="connsiteY3" fmla="*/ 2497156 h 2497156"/>
+              <a:gd name="connsiteX4" fmla="*/ 9514 w 2876550"/>
+              <a:gd name="connsiteY4" fmla="*/ 4027 h 2497156"/>
+              <a:gd name="connsiteX5" fmla="*/ 256884 w 2876550"/>
+              <a:gd name="connsiteY5" fmla="*/ 0 h 2497156"/>
+              <a:gd name="connsiteX0" fmla="*/ 2869062 w 2876550"/>
+              <a:gd name="connsiteY0" fmla="*/ 1666826 h 2497156"/>
+              <a:gd name="connsiteX1" fmla="*/ 2876550 w 2876550"/>
+              <a:gd name="connsiteY1" fmla="*/ 2497156 h 2497156"/>
+              <a:gd name="connsiteX2" fmla="*/ 0 w 2876550"/>
+              <a:gd name="connsiteY2" fmla="*/ 2497156 h 2497156"/>
+              <a:gd name="connsiteX3" fmla="*/ 9514 w 2876550"/>
+              <a:gd name="connsiteY3" fmla="*/ 4027 h 2497156"/>
+              <a:gd name="connsiteX4" fmla="*/ 256884 w 2876550"/>
+              <a:gd name="connsiteY4" fmla="*/ 0 h 2497156"/>
+              <a:gd name="connsiteX0" fmla="*/ 2884979 w 2884979"/>
+              <a:gd name="connsiteY0" fmla="*/ 1670778 h 2497156"/>
+              <a:gd name="connsiteX1" fmla="*/ 2876550 w 2884979"/>
+              <a:gd name="connsiteY1" fmla="*/ 2497156 h 2497156"/>
+              <a:gd name="connsiteX2" fmla="*/ 0 w 2884979"/>
+              <a:gd name="connsiteY2" fmla="*/ 2497156 h 2497156"/>
+              <a:gd name="connsiteX3" fmla="*/ 9514 w 2884979"/>
+              <a:gd name="connsiteY3" fmla="*/ 4027 h 2497156"/>
+              <a:gd name="connsiteX4" fmla="*/ 256884 w 2884979"/>
+              <a:gd name="connsiteY4" fmla="*/ 0 h 2497156"/>
+              <a:gd name="connsiteX0" fmla="*/ 2879673 w 2879673"/>
+              <a:gd name="connsiteY0" fmla="*/ 1670778 h 2497156"/>
+              <a:gd name="connsiteX1" fmla="*/ 2876550 w 2879673"/>
+              <a:gd name="connsiteY1" fmla="*/ 2497156 h 2497156"/>
+              <a:gd name="connsiteX2" fmla="*/ 0 w 2879673"/>
+              <a:gd name="connsiteY2" fmla="*/ 2497156 h 2497156"/>
+              <a:gd name="connsiteX3" fmla="*/ 9514 w 2879673"/>
+              <a:gd name="connsiteY3" fmla="*/ 4027 h 2497156"/>
+              <a:gd name="connsiteX4" fmla="*/ 256884 w 2879673"/>
+              <a:gd name="connsiteY4" fmla="*/ 0 h 2497156"/>
             </a:gdLst>
             <a:ahLst/>
             <a:cxnLst>
@@ -6868,13 +6940,15 @@
             </a:cxnLst>
             <a:rect l="l" t="t" r="r" b="b"/>
             <a:pathLst>
-              <a:path w="2876550" h="2497156">
+              <a:path w="2879673" h="2497156">
                 <a:moveTo>
-                  <a:pt x="2876550" y="1316056"/>
+                  <a:pt x="2879673" y="1670778"/>
                 </a:moveTo>
-                <a:lnTo>
+                <a:cubicBezTo>
+                  <a:pt x="2876863" y="1946237"/>
+                  <a:pt x="2879360" y="2221697"/>
                   <a:pt x="2876550" y="2497156"/>
-                </a:lnTo>
+                </a:cubicBezTo>
                 <a:lnTo>
                   <a:pt x="0" y="2497156"/>
                 </a:lnTo>
@@ -6930,7 +7004,7 @@
         </p:nvCxnSpPr>
         <p:spPr>
           <a:xfrm flipH="1">
-            <a:off x="7814466" y="4259090"/>
+            <a:off x="7970850" y="4259090"/>
             <a:ext cx="1060282" cy="0"/>
           </a:xfrm>
           <a:prstGeom prst="straightConnector1">
@@ -6967,7 +7041,7 @@
         </p:nvSpPr>
         <p:spPr>
           <a:xfrm>
-            <a:off x="7849927" y="3882129"/>
+            <a:off x="7980553" y="3882129"/>
             <a:ext cx="995785" cy="307777"/>
           </a:xfrm>
           <a:prstGeom prst="rect">
@@ -6982,12 +7056,12 @@
           <a:lstStyle/>
           <a:p>
             <a:r>
-              <a:rPr lang="en-US" sz="1400" smtClean="0">
+              <a:rPr lang="en-US" sz="1400" dirty="0" smtClean="0">
                 <a:latin typeface="Verdana" charset="0"/>
                 <a:ea typeface="Verdana" charset="0"/>
                 <a:cs typeface="Verdana" charset="0"/>
               </a:rPr>
-              <a:t>Bypass 3</a:t>
+              <a:t>Bypass 4</a:t>
             </a:r>
             <a:endParaRPr lang="en-US" dirty="0">
               <a:latin typeface="Verdana" charset="0"/>
@@ -7005,8 +7079,8 @@
         </p:nvSpPr>
         <p:spPr>
           <a:xfrm>
-            <a:off x="3068827" y="3107853"/>
-            <a:ext cx="704805" cy="2755027"/>
+            <a:off x="3199453" y="3086647"/>
+            <a:ext cx="704805" cy="2986607"/>
           </a:xfrm>
           <a:custGeom>
             <a:avLst/>
@@ -7138,7 +7212,7 @@
         </p:nvCxnSpPr>
         <p:spPr>
           <a:xfrm>
-            <a:off x="2249087" y="5253486"/>
+            <a:off x="2379713" y="5253486"/>
             <a:ext cx="1215306" cy="0"/>
           </a:xfrm>
           <a:prstGeom prst="straightConnector1">
@@ -7175,7 +7249,7 @@
         </p:nvSpPr>
         <p:spPr>
           <a:xfrm>
-            <a:off x="2353669" y="4889136"/>
+            <a:off x="2484295" y="4889136"/>
             <a:ext cx="995785" cy="307777"/>
           </a:xfrm>
           <a:prstGeom prst="rect">
@@ -7190,7 +7264,7 @@
           <a:lstStyle/>
           <a:p>
             <a:r>
-              <a:rPr lang="en-US" sz="1400" smtClean="0">
+              <a:rPr lang="en-US" sz="1400" dirty="0" smtClean="0">
                 <a:latin typeface="Verdana" charset="0"/>
                 <a:ea typeface="Verdana" charset="0"/>
                 <a:cs typeface="Verdana" charset="0"/>
@@ -7208,13 +7282,15 @@
       <p:cxnSp>
         <p:nvCxnSpPr>
           <p:cNvPr id="166" name="Straight Arrow Connector 165"/>
-          <p:cNvCxnSpPr/>
+          <p:cNvCxnSpPr>
+            <a:stCxn id="14" idx="3"/>
+          </p:cNvCxnSpPr>
           <p:nvPr/>
         </p:nvCxnSpPr>
         <p:spPr>
-          <a:xfrm>
-            <a:off x="7588386" y="2858165"/>
-            <a:ext cx="261541" cy="0"/>
+          <a:xfrm flipV="1">
+            <a:off x="7695338" y="1759159"/>
+            <a:ext cx="240437" cy="2661"/>
           </a:xfrm>
           <a:prstGeom prst="straightConnector1">
             <a:avLst/>
@@ -7250,7 +7326,7 @@
         </p:nvSpPr>
         <p:spPr>
           <a:xfrm>
-            <a:off x="10546294" y="6329211"/>
+            <a:off x="10676920" y="6329211"/>
             <a:ext cx="1369044" cy="369332"/>
           </a:xfrm>
           <a:prstGeom prst="rect">
@@ -7302,7 +7378,7 @@
         </p:nvCxnSpPr>
         <p:spPr>
           <a:xfrm rot="16200000" flipH="1">
-            <a:off x="10822622" y="5902500"/>
+            <a:off x="10953248" y="5902500"/>
             <a:ext cx="447812" cy="368575"/>
           </a:xfrm>
           <a:prstGeom prst="bentConnector3">
@@ -7340,7 +7416,7 @@
         </p:nvSpPr>
         <p:spPr>
           <a:xfrm>
-            <a:off x="3623063" y="3455929"/>
+            <a:off x="3753689" y="3439049"/>
             <a:ext cx="2116108" cy="369332"/>
           </a:xfrm>
           <a:prstGeom prst="rect">
@@ -7394,7 +7470,7 @@
         </p:nvCxnSpPr>
         <p:spPr>
           <a:xfrm>
-            <a:off x="3464393" y="3640595"/>
+            <a:off x="3595019" y="3623715"/>
             <a:ext cx="158670" cy="0"/>
           </a:xfrm>
           <a:prstGeom prst="line">
@@ -7429,7 +7505,7 @@
         </p:nvCxnSpPr>
         <p:spPr>
           <a:xfrm>
-            <a:off x="5744584" y="3640595"/>
+            <a:off x="5875210" y="3623715"/>
             <a:ext cx="175992" cy="0"/>
           </a:xfrm>
           <a:prstGeom prst="line">
@@ -7456,6 +7532,542 @@
           </a:fontRef>
         </p:style>
       </p:cxnSp>
+      <p:sp>
+        <p:nvSpPr>
+          <p:cNvPr id="187" name="Freeform 186"/>
+          <p:cNvSpPr/>
+          <p:nvPr/>
+        </p:nvSpPr>
+        <p:spPr>
+          <a:xfrm>
+            <a:off x="914172" y="2164276"/>
+            <a:ext cx="1445378" cy="3299618"/>
+          </a:xfrm>
+          <a:custGeom>
+            <a:avLst/>
+            <a:gdLst>
+              <a:gd name="connsiteX0" fmla="*/ 982639 w 1064526"/>
+              <a:gd name="connsiteY0" fmla="*/ 0 h 2988860"/>
+              <a:gd name="connsiteX1" fmla="*/ 0 w 1064526"/>
+              <a:gd name="connsiteY1" fmla="*/ 0 h 2988860"/>
+              <a:gd name="connsiteX2" fmla="*/ 0 w 1064526"/>
+              <a:gd name="connsiteY2" fmla="*/ 2988860 h 2988860"/>
+              <a:gd name="connsiteX3" fmla="*/ 1064526 w 1064526"/>
+              <a:gd name="connsiteY3" fmla="*/ 2988860 h 2988860"/>
+              <a:gd name="connsiteX0" fmla="*/ 0 w 1064526"/>
+              <a:gd name="connsiteY0" fmla="*/ 0 h 2988860"/>
+              <a:gd name="connsiteX1" fmla="*/ 0 w 1064526"/>
+              <a:gd name="connsiteY1" fmla="*/ 2988860 h 2988860"/>
+              <a:gd name="connsiteX2" fmla="*/ 1064526 w 1064526"/>
+              <a:gd name="connsiteY2" fmla="*/ 2988860 h 2988860"/>
+            </a:gdLst>
+            <a:ahLst/>
+            <a:cxnLst>
+              <a:cxn ang="0">
+                <a:pos x="connsiteX0" y="connsiteY0"/>
+              </a:cxn>
+              <a:cxn ang="0">
+                <a:pos x="connsiteX1" y="connsiteY1"/>
+              </a:cxn>
+              <a:cxn ang="0">
+                <a:pos x="connsiteX2" y="connsiteY2"/>
+              </a:cxn>
+            </a:cxnLst>
+            <a:rect l="l" t="t" r="r" b="b"/>
+            <a:pathLst>
+              <a:path w="1064526" h="2988860">
+                <a:moveTo>
+                  <a:pt x="0" y="0"/>
+                </a:moveTo>
+                <a:lnTo>
+                  <a:pt x="0" y="2988860"/>
+                </a:lnTo>
+                <a:lnTo>
+                  <a:pt x="1064526" y="2988860"/>
+                </a:lnTo>
+              </a:path>
+            </a:pathLst>
+          </a:custGeom>
+          <a:noFill/>
+          <a:ln w="28575">
+            <a:solidFill>
+              <a:schemeClr val="tx1"/>
+            </a:solidFill>
+            <a:tailEnd type="triangle" w="lg" len="lg"/>
+          </a:ln>
+        </p:spPr>
+        <p:style>
+          <a:lnRef idx="2">
+            <a:schemeClr val="accent1">
+              <a:shade val="50000"/>
+            </a:schemeClr>
+          </a:lnRef>
+          <a:fillRef idx="1">
+            <a:schemeClr val="accent1"/>
+          </a:fillRef>
+          <a:effectRef idx="0">
+            <a:schemeClr val="accent1"/>
+          </a:effectRef>
+          <a:fontRef idx="minor">
+            <a:schemeClr val="lt1"/>
+          </a:fontRef>
+        </p:style>
+        <p:txBody>
+          <a:bodyPr rtlCol="0" anchor="ctr"/>
+          <a:lstStyle/>
+          <a:p>
+            <a:pPr algn="ctr"/>
+            <a:endParaRPr lang="en-US"/>
+          </a:p>
+        </p:txBody>
+      </p:sp>
+      <p:sp>
+        <p:nvSpPr>
+          <p:cNvPr id="188" name="Freeform 187"/>
+          <p:cNvSpPr/>
+          <p:nvPr/>
+        </p:nvSpPr>
+        <p:spPr>
+          <a:xfrm>
+            <a:off x="3595018" y="2169185"/>
+            <a:ext cx="1214108" cy="917462"/>
+          </a:xfrm>
+          <a:custGeom>
+            <a:avLst/>
+            <a:gdLst>
+              <a:gd name="connsiteX0" fmla="*/ 2387600 w 2387600"/>
+              <a:gd name="connsiteY0" fmla="*/ 0 h 948266"/>
+              <a:gd name="connsiteX1" fmla="*/ 2387600 w 2387600"/>
+              <a:gd name="connsiteY1" fmla="*/ 406400 h 948266"/>
+              <a:gd name="connsiteX2" fmla="*/ 0 w 2387600"/>
+              <a:gd name="connsiteY2" fmla="*/ 423333 h 948266"/>
+              <a:gd name="connsiteX3" fmla="*/ 0 w 2387600"/>
+              <a:gd name="connsiteY3" fmla="*/ 948266 h 948266"/>
+              <a:gd name="connsiteX0" fmla="*/ 2398910 w 2398910"/>
+              <a:gd name="connsiteY0" fmla="*/ 0 h 948266"/>
+              <a:gd name="connsiteX1" fmla="*/ 2398910 w 2398910"/>
+              <a:gd name="connsiteY1" fmla="*/ 406400 h 948266"/>
+              <a:gd name="connsiteX2" fmla="*/ 0 w 2398910"/>
+              <a:gd name="connsiteY2" fmla="*/ 537167 h 948266"/>
+              <a:gd name="connsiteX3" fmla="*/ 11310 w 2398910"/>
+              <a:gd name="connsiteY3" fmla="*/ 948266 h 948266"/>
+              <a:gd name="connsiteX0" fmla="*/ 2398910 w 2404565"/>
+              <a:gd name="connsiteY0" fmla="*/ 0 h 948266"/>
+              <a:gd name="connsiteX1" fmla="*/ 2404565 w 2404565"/>
+              <a:gd name="connsiteY1" fmla="*/ 571461 h 948266"/>
+              <a:gd name="connsiteX2" fmla="*/ 0 w 2404565"/>
+              <a:gd name="connsiteY2" fmla="*/ 537167 h 948266"/>
+              <a:gd name="connsiteX3" fmla="*/ 11310 w 2404565"/>
+              <a:gd name="connsiteY3" fmla="*/ 948266 h 948266"/>
+              <a:gd name="connsiteX0" fmla="*/ 2398910 w 2404565"/>
+              <a:gd name="connsiteY0" fmla="*/ 0 h 948266"/>
+              <a:gd name="connsiteX1" fmla="*/ 2404565 w 2404565"/>
+              <a:gd name="connsiteY1" fmla="*/ 543001 h 948266"/>
+              <a:gd name="connsiteX2" fmla="*/ 0 w 2404565"/>
+              <a:gd name="connsiteY2" fmla="*/ 537167 h 948266"/>
+              <a:gd name="connsiteX3" fmla="*/ 11310 w 2404565"/>
+              <a:gd name="connsiteY3" fmla="*/ 948266 h 948266"/>
+              <a:gd name="connsiteX0" fmla="*/ 2387600 w 2393255"/>
+              <a:gd name="connsiteY0" fmla="*/ 0 h 948266"/>
+              <a:gd name="connsiteX1" fmla="*/ 2393255 w 2393255"/>
+              <a:gd name="connsiteY1" fmla="*/ 543001 h 948266"/>
+              <a:gd name="connsiteX2" fmla="*/ 5654 w 2393255"/>
+              <a:gd name="connsiteY2" fmla="*/ 542858 h 948266"/>
+              <a:gd name="connsiteX3" fmla="*/ 0 w 2393255"/>
+              <a:gd name="connsiteY3" fmla="*/ 948266 h 948266"/>
+              <a:gd name="connsiteX0" fmla="*/ 2387600 w 2393255"/>
+              <a:gd name="connsiteY0" fmla="*/ 0 h 948266"/>
+              <a:gd name="connsiteX1" fmla="*/ 2393255 w 2393255"/>
+              <a:gd name="connsiteY1" fmla="*/ 543001 h 948266"/>
+              <a:gd name="connsiteX2" fmla="*/ 5654 w 2393255"/>
+              <a:gd name="connsiteY2" fmla="*/ 548549 h 948266"/>
+              <a:gd name="connsiteX3" fmla="*/ 0 w 2393255"/>
+              <a:gd name="connsiteY3" fmla="*/ 948266 h 948266"/>
+              <a:gd name="connsiteX0" fmla="*/ 2388145 w 2393800"/>
+              <a:gd name="connsiteY0" fmla="*/ 0 h 948266"/>
+              <a:gd name="connsiteX1" fmla="*/ 2393800 w 2393800"/>
+              <a:gd name="connsiteY1" fmla="*/ 543001 h 948266"/>
+              <a:gd name="connsiteX2" fmla="*/ 544 w 2393800"/>
+              <a:gd name="connsiteY2" fmla="*/ 548549 h 948266"/>
+              <a:gd name="connsiteX3" fmla="*/ 545 w 2393800"/>
+              <a:gd name="connsiteY3" fmla="*/ 948266 h 948266"/>
+              <a:gd name="connsiteX0" fmla="*/ 2388145 w 2393800"/>
+              <a:gd name="connsiteY0" fmla="*/ 0 h 948266"/>
+              <a:gd name="connsiteX1" fmla="*/ 2393800 w 2393800"/>
+              <a:gd name="connsiteY1" fmla="*/ 543001 h 948266"/>
+              <a:gd name="connsiteX2" fmla="*/ 545 w 2393800"/>
+              <a:gd name="connsiteY2" fmla="*/ 503121 h 948266"/>
+              <a:gd name="connsiteX3" fmla="*/ 545 w 2393800"/>
+              <a:gd name="connsiteY3" fmla="*/ 948266 h 948266"/>
+              <a:gd name="connsiteX0" fmla="*/ 2388145 w 2393800"/>
+              <a:gd name="connsiteY0" fmla="*/ 0 h 948266"/>
+              <a:gd name="connsiteX1" fmla="*/ 2393800 w 2393800"/>
+              <a:gd name="connsiteY1" fmla="*/ 512716 h 948266"/>
+              <a:gd name="connsiteX2" fmla="*/ 545 w 2393800"/>
+              <a:gd name="connsiteY2" fmla="*/ 503121 h 948266"/>
+              <a:gd name="connsiteX3" fmla="*/ 545 w 2393800"/>
+              <a:gd name="connsiteY3" fmla="*/ 948266 h 948266"/>
+              <a:gd name="connsiteX0" fmla="*/ 2388145 w 2388145"/>
+              <a:gd name="connsiteY0" fmla="*/ 0 h 948266"/>
+              <a:gd name="connsiteX1" fmla="*/ 2380277 w 2388145"/>
+              <a:gd name="connsiteY1" fmla="*/ 507081 h 948266"/>
+              <a:gd name="connsiteX2" fmla="*/ 545 w 2388145"/>
+              <a:gd name="connsiteY2" fmla="*/ 503121 h 948266"/>
+              <a:gd name="connsiteX3" fmla="*/ 545 w 2388145"/>
+              <a:gd name="connsiteY3" fmla="*/ 948266 h 948266"/>
+              <a:gd name="connsiteX0" fmla="*/ 2388145 w 2388145"/>
+              <a:gd name="connsiteY0" fmla="*/ 0 h 807371"/>
+              <a:gd name="connsiteX1" fmla="*/ 2380277 w 2388145"/>
+              <a:gd name="connsiteY1" fmla="*/ 366186 h 807371"/>
+              <a:gd name="connsiteX2" fmla="*/ 545 w 2388145"/>
+              <a:gd name="connsiteY2" fmla="*/ 362226 h 807371"/>
+              <a:gd name="connsiteX3" fmla="*/ 545 w 2388145"/>
+              <a:gd name="connsiteY3" fmla="*/ 807371 h 807371"/>
+            </a:gdLst>
+            <a:ahLst/>
+            <a:cxnLst>
+              <a:cxn ang="0">
+                <a:pos x="connsiteX0" y="connsiteY0"/>
+              </a:cxn>
+              <a:cxn ang="0">
+                <a:pos x="connsiteX1" y="connsiteY1"/>
+              </a:cxn>
+              <a:cxn ang="0">
+                <a:pos x="connsiteX2" y="connsiteY2"/>
+              </a:cxn>
+              <a:cxn ang="0">
+                <a:pos x="connsiteX3" y="connsiteY3"/>
+              </a:cxn>
+            </a:cxnLst>
+            <a:rect l="l" t="t" r="r" b="b"/>
+            <a:pathLst>
+              <a:path w="2388145" h="807371">
+                <a:moveTo>
+                  <a:pt x="2388145" y="0"/>
+                </a:moveTo>
+                <a:lnTo>
+                  <a:pt x="2380277" y="366186"/>
+                </a:lnTo>
+                <a:lnTo>
+                  <a:pt x="545" y="362226"/>
+                </a:lnTo>
+                <a:cubicBezTo>
+                  <a:pt x="-1340" y="497362"/>
+                  <a:pt x="2430" y="672235"/>
+                  <a:pt x="545" y="807371"/>
+                </a:cubicBezTo>
+              </a:path>
+            </a:pathLst>
+          </a:custGeom>
+          <a:noFill/>
+          <a:ln w="28575">
+            <a:solidFill>
+              <a:schemeClr val="tx1"/>
+            </a:solidFill>
+            <a:tailEnd type="triangle" w="lg" len="lg"/>
+          </a:ln>
+        </p:spPr>
+        <p:style>
+          <a:lnRef idx="2">
+            <a:schemeClr val="accent1">
+              <a:shade val="50000"/>
+            </a:schemeClr>
+          </a:lnRef>
+          <a:fillRef idx="1">
+            <a:schemeClr val="accent1"/>
+          </a:fillRef>
+          <a:effectRef idx="0">
+            <a:schemeClr val="accent1"/>
+          </a:effectRef>
+          <a:fontRef idx="minor">
+            <a:schemeClr val="lt1"/>
+          </a:fontRef>
+        </p:style>
+        <p:txBody>
+          <a:bodyPr rtlCol="0" anchor="ctr"/>
+          <a:lstStyle/>
+          <a:p>
+            <a:pPr algn="ctr"/>
+            <a:endParaRPr lang="en-US"/>
+          </a:p>
+        </p:txBody>
+      </p:sp>
+      <p:sp>
+        <p:nvSpPr>
+          <p:cNvPr id="200" name="Freeform 199"/>
+          <p:cNvSpPr/>
+          <p:nvPr/>
+        </p:nvSpPr>
+        <p:spPr>
+          <a:xfrm>
+            <a:off x="3595606" y="3993047"/>
+            <a:ext cx="2405111" cy="1650085"/>
+          </a:xfrm>
+          <a:custGeom>
+            <a:avLst/>
+            <a:gdLst>
+              <a:gd name="connsiteX0" fmla="*/ 0 w 2371240"/>
+              <a:gd name="connsiteY0" fmla="*/ 1162373 h 1177871"/>
+              <a:gd name="connsiteX1" fmla="*/ 2107769 w 2371240"/>
+              <a:gd name="connsiteY1" fmla="*/ 1177871 h 1177871"/>
+              <a:gd name="connsiteX2" fmla="*/ 2107769 w 2371240"/>
+              <a:gd name="connsiteY2" fmla="*/ 0 h 1177871"/>
+              <a:gd name="connsiteX3" fmla="*/ 2371240 w 2371240"/>
+              <a:gd name="connsiteY3" fmla="*/ 15498 h 1177871"/>
+              <a:gd name="connsiteX0" fmla="*/ 0 w 2371240"/>
+              <a:gd name="connsiteY0" fmla="*/ 1162373 h 1164121"/>
+              <a:gd name="connsiteX1" fmla="*/ 2094019 w 2371240"/>
+              <a:gd name="connsiteY1" fmla="*/ 1164121 h 1164121"/>
+              <a:gd name="connsiteX2" fmla="*/ 2107769 w 2371240"/>
+              <a:gd name="connsiteY2" fmla="*/ 0 h 1164121"/>
+              <a:gd name="connsiteX3" fmla="*/ 2371240 w 2371240"/>
+              <a:gd name="connsiteY3" fmla="*/ 15498 h 1164121"/>
+              <a:gd name="connsiteX0" fmla="*/ 0 w 2371240"/>
+              <a:gd name="connsiteY0" fmla="*/ 1361753 h 1363501"/>
+              <a:gd name="connsiteX1" fmla="*/ 2094019 w 2371240"/>
+              <a:gd name="connsiteY1" fmla="*/ 1363501 h 1363501"/>
+              <a:gd name="connsiteX2" fmla="*/ 2094019 w 2371240"/>
+              <a:gd name="connsiteY2" fmla="*/ 0 h 1363501"/>
+              <a:gd name="connsiteX3" fmla="*/ 2371240 w 2371240"/>
+              <a:gd name="connsiteY3" fmla="*/ 214878 h 1363501"/>
+              <a:gd name="connsiteX0" fmla="*/ 0 w 2371240"/>
+              <a:gd name="connsiteY0" fmla="*/ 1361753 h 1363501"/>
+              <a:gd name="connsiteX1" fmla="*/ 2094019 w 2371240"/>
+              <a:gd name="connsiteY1" fmla="*/ 1363501 h 1363501"/>
+              <a:gd name="connsiteX2" fmla="*/ 2094019 w 2371240"/>
+              <a:gd name="connsiteY2" fmla="*/ 0 h 1363501"/>
+              <a:gd name="connsiteX3" fmla="*/ 2371240 w 2371240"/>
+              <a:gd name="connsiteY3" fmla="*/ 1747 h 1363501"/>
+            </a:gdLst>
+            <a:ahLst/>
+            <a:cxnLst>
+              <a:cxn ang="0">
+                <a:pos x="connsiteX0" y="connsiteY0"/>
+              </a:cxn>
+              <a:cxn ang="0">
+                <a:pos x="connsiteX1" y="connsiteY1"/>
+              </a:cxn>
+              <a:cxn ang="0">
+                <a:pos x="connsiteX2" y="connsiteY2"/>
+              </a:cxn>
+              <a:cxn ang="0">
+                <a:pos x="connsiteX3" y="connsiteY3"/>
+              </a:cxn>
+            </a:cxnLst>
+            <a:rect l="l" t="t" r="r" b="b"/>
+            <a:pathLst>
+              <a:path w="2371240" h="1363501">
+                <a:moveTo>
+                  <a:pt x="0" y="1361753"/>
+                </a:moveTo>
+                <a:lnTo>
+                  <a:pt x="2094019" y="1363501"/>
+                </a:lnTo>
+                <a:lnTo>
+                  <a:pt x="2094019" y="0"/>
+                </a:lnTo>
+                <a:lnTo>
+                  <a:pt x="2371240" y="1747"/>
+                </a:lnTo>
+              </a:path>
+            </a:pathLst>
+          </a:custGeom>
+          <a:noFill/>
+          <a:ln w="28575">
+            <a:solidFill>
+              <a:schemeClr val="tx1"/>
+            </a:solidFill>
+            <a:headEnd type="none" w="med" len="med"/>
+            <a:tailEnd type="none" w="med" len="med"/>
+          </a:ln>
+        </p:spPr>
+        <p:style>
+          <a:lnRef idx="2">
+            <a:schemeClr val="accent1">
+              <a:shade val="50000"/>
+            </a:schemeClr>
+          </a:lnRef>
+          <a:fillRef idx="1">
+            <a:schemeClr val="accent1"/>
+          </a:fillRef>
+          <a:effectRef idx="0">
+            <a:schemeClr val="accent1"/>
+          </a:effectRef>
+          <a:fontRef idx="minor">
+            <a:schemeClr val="lt1"/>
+          </a:fontRef>
+        </p:style>
+        <p:txBody>
+          <a:bodyPr rtlCol="0" anchor="ctr"/>
+          <a:lstStyle/>
+          <a:p>
+            <a:pPr algn="ctr"/>
+            <a:endParaRPr lang="en-US"/>
+          </a:p>
+        </p:txBody>
+      </p:sp>
+      <p:cxnSp>
+        <p:nvCxnSpPr>
+          <p:cNvPr id="202" name="Straight Connector 201"/>
+          <p:cNvCxnSpPr/>
+          <p:nvPr/>
+        </p:nvCxnSpPr>
+        <p:spPr>
+          <a:xfrm>
+            <a:off x="6102285" y="3993047"/>
+            <a:ext cx="153412" cy="0"/>
+          </a:xfrm>
+          <a:prstGeom prst="line">
+            <a:avLst/>
+          </a:prstGeom>
+          <a:ln w="28575">
+            <a:solidFill>
+              <a:schemeClr val="tx1"/>
+            </a:solidFill>
+          </a:ln>
+        </p:spPr>
+        <p:style>
+          <a:lnRef idx="1">
+            <a:schemeClr val="accent1"/>
+          </a:lnRef>
+          <a:fillRef idx="0">
+            <a:schemeClr val="accent1"/>
+          </a:fillRef>
+          <a:effectRef idx="0">
+            <a:schemeClr val="accent1"/>
+          </a:effectRef>
+          <a:fontRef idx="minor">
+            <a:schemeClr val="tx1"/>
+          </a:fontRef>
+        </p:style>
+      </p:cxnSp>
+      <p:sp>
+        <p:nvSpPr>
+          <p:cNvPr id="203" name="Freeform 202"/>
+          <p:cNvSpPr/>
+          <p:nvPr/>
+        </p:nvSpPr>
+        <p:spPr>
+          <a:xfrm>
+            <a:off x="6369292" y="3994302"/>
+            <a:ext cx="1576260" cy="9108"/>
+          </a:xfrm>
+          <a:custGeom>
+            <a:avLst/>
+            <a:gdLst>
+              <a:gd name="connsiteX0" fmla="*/ 0 w 1540565"/>
+              <a:gd name="connsiteY0" fmla="*/ 0 h 9939"/>
+              <a:gd name="connsiteX1" fmla="*/ 1540565 w 1540565"/>
+              <a:gd name="connsiteY1" fmla="*/ 9939 h 9939"/>
+              <a:gd name="connsiteX0" fmla="*/ 0 w 9972"/>
+              <a:gd name="connsiteY0" fmla="*/ 0 h 2557"/>
+              <a:gd name="connsiteX1" fmla="*/ 9972 w 9972"/>
+              <a:gd name="connsiteY1" fmla="*/ 2557 h 2557"/>
+              <a:gd name="connsiteX0" fmla="*/ 0 w 10000"/>
+              <a:gd name="connsiteY0" fmla="*/ 0 h 3531"/>
+              <a:gd name="connsiteX1" fmla="*/ 10000 w 10000"/>
+              <a:gd name="connsiteY1" fmla="*/ 3531 h 3531"/>
+              <a:gd name="connsiteX0" fmla="*/ 0 w 10000"/>
+              <a:gd name="connsiteY0" fmla="*/ 0 h 37478"/>
+              <a:gd name="connsiteX1" fmla="*/ 10000 w 10000"/>
+              <a:gd name="connsiteY1" fmla="*/ 37478 h 37478"/>
+              <a:gd name="connsiteX0" fmla="*/ 0 w 10000"/>
+              <a:gd name="connsiteY0" fmla="*/ 0 h 19159"/>
+              <a:gd name="connsiteX1" fmla="*/ 10000 w 10000"/>
+              <a:gd name="connsiteY1" fmla="*/ 19159 h 19159"/>
+            </a:gdLst>
+            <a:ahLst/>
+            <a:cxnLst>
+              <a:cxn ang="0">
+                <a:pos x="connsiteX0" y="connsiteY0"/>
+              </a:cxn>
+              <a:cxn ang="0">
+                <a:pos x="connsiteX1" y="connsiteY1"/>
+              </a:cxn>
+            </a:cxnLst>
+            <a:rect l="l" t="t" r="r" b="b"/>
+            <a:pathLst>
+              <a:path w="10000" h="19159">
+                <a:moveTo>
+                  <a:pt x="0" y="0"/>
+                </a:moveTo>
+                <a:lnTo>
+                  <a:pt x="10000" y="19159"/>
+                </a:lnTo>
+              </a:path>
+            </a:pathLst>
+          </a:custGeom>
+          <a:noFill/>
+          <a:ln w="28575">
+            <a:solidFill>
+              <a:schemeClr val="tx1"/>
+            </a:solidFill>
+            <a:tailEnd type="triangle" w="lg" len="lg"/>
+          </a:ln>
+        </p:spPr>
+        <p:style>
+          <a:lnRef idx="2">
+            <a:schemeClr val="accent1">
+              <a:shade val="50000"/>
+            </a:schemeClr>
+          </a:lnRef>
+          <a:fillRef idx="1">
+            <a:schemeClr val="accent1"/>
+          </a:fillRef>
+          <a:effectRef idx="0">
+            <a:schemeClr val="accent1"/>
+          </a:effectRef>
+          <a:fontRef idx="minor">
+            <a:schemeClr val="lt1"/>
+          </a:fontRef>
+        </p:style>
+        <p:txBody>
+          <a:bodyPr rtlCol="0" anchor="ctr"/>
+          <a:lstStyle/>
+          <a:p>
+            <a:pPr algn="ctr"/>
+            <a:endParaRPr lang="en-US"/>
+          </a:p>
+        </p:txBody>
+      </p:sp>
+      <p:sp>
+        <p:nvSpPr>
+          <p:cNvPr id="205" name="TextBox 204"/>
+          <p:cNvSpPr txBox="1"/>
+          <p:nvPr/>
+        </p:nvSpPr>
+        <p:spPr>
+          <a:xfrm>
+            <a:off x="4157313" y="5273661"/>
+            <a:ext cx="995785" cy="307777"/>
+          </a:xfrm>
+          <a:prstGeom prst="rect">
+            <a:avLst/>
+          </a:prstGeom>
+          <a:noFill/>
+        </p:spPr>
+        <p:txBody>
+          <a:bodyPr wrap="none" rtlCol="0">
+            <a:spAutoFit/>
+          </a:bodyPr>
+          <a:lstStyle/>
+          <a:p>
+            <a:r>
+              <a:rPr lang="en-US" sz="1400" dirty="0" smtClean="0">
+                <a:latin typeface="Verdana" charset="0"/>
+                <a:ea typeface="Verdana" charset="0"/>
+                <a:cs typeface="Verdana" charset="0"/>
+              </a:rPr>
+              <a:t>Bypass 3</a:t>
+            </a:r>
+            <a:endParaRPr lang="en-US" dirty="0">
+              <a:latin typeface="Verdana" charset="0"/>
+              <a:ea typeface="Verdana" charset="0"/>
+              <a:cs typeface="Verdana" charset="0"/>
+            </a:endParaRPr>
+          </a:p>
+        </p:txBody>
+      </p:sp>
     </p:spTree>
     <p:extLst>
       <p:ext uri="{BB962C8B-B14F-4D97-AF65-F5344CB8AC3E}">

</xml_diff>

<commit_message>
updated ppt slide with valves
</commit_message>
<xml_diff>
--- a/HRS Setup.pptx
+++ b/HRS Setup.pptx
@@ -104,6 +104,11 @@
       </a:defRPr>
     </a:lvl9pPr>
   </p:defaultTextStyle>
+  <p:extLst>
+    <p:ext uri="{EFAFB233-063F-42B5-8137-9DF3F51BA10A}">
+      <p15:sldGuideLst xmlns:p15="http://schemas.microsoft.com/office/powerpoint/2012/main"/>
+    </p:ext>
+  </p:extLst>
 </p:presentation>
 </file>
 
@@ -149,10 +154,9 @@
           </a:lstStyle>
           <a:p>
             <a:r>
-              <a:rPr lang="en-US" smtClean="0"/>
+              <a:rPr lang="en-US"/>
               <a:t>Click to edit Master title style</a:t>
             </a:r>
-            <a:endParaRPr lang="en-US"/>
           </a:p>
         </p:txBody>
       </p:sp>
@@ -214,10 +218,9 @@
           </a:lstStyle>
           <a:p>
             <a:r>
-              <a:rPr lang="en-US" smtClean="0"/>
+              <a:rPr lang="en-US"/>
               <a:t>Click to edit Master subtitle style</a:t>
             </a:r>
-            <a:endParaRPr lang="en-US"/>
           </a:p>
         </p:txBody>
       </p:sp>
@@ -238,7 +241,7 @@
           <a:p>
             <a:fld id="{07B49D9B-B35E-094A-87A6-0FB71602174F}" type="datetimeFigureOut">
               <a:rPr lang="en-US" smtClean="0"/>
-              <a:t>6/24/18</a:t>
+              <a:t>6/25/18</a:t>
             </a:fld>
             <a:endParaRPr lang="en-US"/>
           </a:p>
@@ -332,10 +335,9 @@
           <a:lstStyle/>
           <a:p>
             <a:r>
-              <a:rPr lang="en-US" smtClean="0"/>
+              <a:rPr lang="en-US"/>
               <a:t>Click to edit Master title style</a:t>
             </a:r>
-            <a:endParaRPr lang="en-US"/>
           </a:p>
         </p:txBody>
       </p:sp>
@@ -356,38 +358,37 @@
           <a:p>
             <a:pPr lvl="0"/>
             <a:r>
-              <a:rPr lang="en-US" smtClean="0"/>
+              <a:rPr lang="en-US"/>
               <a:t>Click to edit Master text styles</a:t>
             </a:r>
           </a:p>
           <a:p>
             <a:pPr lvl="1"/>
             <a:r>
-              <a:rPr lang="en-US" smtClean="0"/>
+              <a:rPr lang="en-US"/>
               <a:t>Second level</a:t>
             </a:r>
           </a:p>
           <a:p>
             <a:pPr lvl="2"/>
             <a:r>
-              <a:rPr lang="en-US" smtClean="0"/>
+              <a:rPr lang="en-US"/>
               <a:t>Third level</a:t>
             </a:r>
           </a:p>
           <a:p>
             <a:pPr lvl="3"/>
             <a:r>
-              <a:rPr lang="en-US" smtClean="0"/>
+              <a:rPr lang="en-US"/>
               <a:t>Fourth level</a:t>
             </a:r>
           </a:p>
           <a:p>
             <a:pPr lvl="4"/>
             <a:r>
-              <a:rPr lang="en-US" smtClean="0"/>
+              <a:rPr lang="en-US"/>
               <a:t>Fifth level</a:t>
             </a:r>
-            <a:endParaRPr lang="en-US"/>
           </a:p>
         </p:txBody>
       </p:sp>
@@ -408,7 +409,7 @@
           <a:p>
             <a:fld id="{07B49D9B-B35E-094A-87A6-0FB71602174F}" type="datetimeFigureOut">
               <a:rPr lang="en-US" smtClean="0"/>
-              <a:t>6/24/18</a:t>
+              <a:t>6/25/18</a:t>
             </a:fld>
             <a:endParaRPr lang="en-US"/>
           </a:p>
@@ -507,10 +508,9 @@
           <a:lstStyle/>
           <a:p>
             <a:r>
-              <a:rPr lang="en-US" smtClean="0"/>
+              <a:rPr lang="en-US"/>
               <a:t>Click to edit Master title style</a:t>
             </a:r>
-            <a:endParaRPr lang="en-US"/>
           </a:p>
         </p:txBody>
       </p:sp>
@@ -536,38 +536,37 @@
           <a:p>
             <a:pPr lvl="0"/>
             <a:r>
-              <a:rPr lang="en-US" smtClean="0"/>
+              <a:rPr lang="en-US"/>
               <a:t>Click to edit Master text styles</a:t>
             </a:r>
           </a:p>
           <a:p>
             <a:pPr lvl="1"/>
             <a:r>
-              <a:rPr lang="en-US" smtClean="0"/>
+              <a:rPr lang="en-US"/>
               <a:t>Second level</a:t>
             </a:r>
           </a:p>
           <a:p>
             <a:pPr lvl="2"/>
             <a:r>
-              <a:rPr lang="en-US" smtClean="0"/>
+              <a:rPr lang="en-US"/>
               <a:t>Third level</a:t>
             </a:r>
           </a:p>
           <a:p>
             <a:pPr lvl="3"/>
             <a:r>
-              <a:rPr lang="en-US" smtClean="0"/>
+              <a:rPr lang="en-US"/>
               <a:t>Fourth level</a:t>
             </a:r>
           </a:p>
           <a:p>
             <a:pPr lvl="4"/>
             <a:r>
-              <a:rPr lang="en-US" smtClean="0"/>
+              <a:rPr lang="en-US"/>
               <a:t>Fifth level</a:t>
             </a:r>
-            <a:endParaRPr lang="en-US"/>
           </a:p>
         </p:txBody>
       </p:sp>
@@ -588,7 +587,7 @@
           <a:p>
             <a:fld id="{07B49D9B-B35E-094A-87A6-0FB71602174F}" type="datetimeFigureOut">
               <a:rPr lang="en-US" smtClean="0"/>
-              <a:t>6/24/18</a:t>
+              <a:t>6/25/18</a:t>
             </a:fld>
             <a:endParaRPr lang="en-US"/>
           </a:p>
@@ -682,10 +681,9 @@
           <a:lstStyle/>
           <a:p>
             <a:r>
-              <a:rPr lang="en-US" smtClean="0"/>
+              <a:rPr lang="en-US"/>
               <a:t>Click to edit Master title style</a:t>
             </a:r>
-            <a:endParaRPr lang="en-US"/>
           </a:p>
         </p:txBody>
       </p:sp>
@@ -706,38 +704,37 @@
           <a:p>
             <a:pPr lvl="0"/>
             <a:r>
-              <a:rPr lang="en-US" smtClean="0"/>
+              <a:rPr lang="en-US"/>
               <a:t>Click to edit Master text styles</a:t>
             </a:r>
           </a:p>
           <a:p>
             <a:pPr lvl="1"/>
             <a:r>
-              <a:rPr lang="en-US" smtClean="0"/>
+              <a:rPr lang="en-US"/>
               <a:t>Second level</a:t>
             </a:r>
           </a:p>
           <a:p>
             <a:pPr lvl="2"/>
             <a:r>
-              <a:rPr lang="en-US" smtClean="0"/>
+              <a:rPr lang="en-US"/>
               <a:t>Third level</a:t>
             </a:r>
           </a:p>
           <a:p>
             <a:pPr lvl="3"/>
             <a:r>
-              <a:rPr lang="en-US" smtClean="0"/>
+              <a:rPr lang="en-US"/>
               <a:t>Fourth level</a:t>
             </a:r>
           </a:p>
           <a:p>
             <a:pPr lvl="4"/>
             <a:r>
-              <a:rPr lang="en-US" smtClean="0"/>
+              <a:rPr lang="en-US"/>
               <a:t>Fifth level</a:t>
             </a:r>
-            <a:endParaRPr lang="en-US"/>
           </a:p>
         </p:txBody>
       </p:sp>
@@ -758,7 +755,7 @@
           <a:p>
             <a:fld id="{07B49D9B-B35E-094A-87A6-0FB71602174F}" type="datetimeFigureOut">
               <a:rPr lang="en-US" smtClean="0"/>
-              <a:t>6/24/18</a:t>
+              <a:t>6/25/18</a:t>
             </a:fld>
             <a:endParaRPr lang="en-US"/>
           </a:p>
@@ -861,10 +858,9 @@
           </a:lstStyle>
           <a:p>
             <a:r>
-              <a:rPr lang="en-US" smtClean="0"/>
+              <a:rPr lang="en-US"/>
               <a:t>Click to edit Master title style</a:t>
             </a:r>
-            <a:endParaRPr lang="en-US"/>
           </a:p>
         </p:txBody>
       </p:sp>
@@ -981,7 +977,7 @@
           <a:p>
             <a:pPr lvl="0"/>
             <a:r>
-              <a:rPr lang="en-US" smtClean="0"/>
+              <a:rPr lang="en-US"/>
               <a:t>Click to edit Master text styles</a:t>
             </a:r>
           </a:p>
@@ -1004,7 +1000,7 @@
           <a:p>
             <a:fld id="{07B49D9B-B35E-094A-87A6-0FB71602174F}" type="datetimeFigureOut">
               <a:rPr lang="en-US" smtClean="0"/>
-              <a:t>6/24/18</a:t>
+              <a:t>6/25/18</a:t>
             </a:fld>
             <a:endParaRPr lang="en-US"/>
           </a:p>
@@ -1098,10 +1094,9 @@
           <a:lstStyle/>
           <a:p>
             <a:r>
-              <a:rPr lang="en-US" smtClean="0"/>
+              <a:rPr lang="en-US"/>
               <a:t>Click to edit Master title style</a:t>
             </a:r>
-            <a:endParaRPr lang="en-US"/>
           </a:p>
         </p:txBody>
       </p:sp>
@@ -1127,38 +1122,37 @@
           <a:p>
             <a:pPr lvl="0"/>
             <a:r>
-              <a:rPr lang="en-US" smtClean="0"/>
+              <a:rPr lang="en-US"/>
               <a:t>Click to edit Master text styles</a:t>
             </a:r>
           </a:p>
           <a:p>
             <a:pPr lvl="1"/>
             <a:r>
-              <a:rPr lang="en-US" smtClean="0"/>
+              <a:rPr lang="en-US"/>
               <a:t>Second level</a:t>
             </a:r>
           </a:p>
           <a:p>
             <a:pPr lvl="2"/>
             <a:r>
-              <a:rPr lang="en-US" smtClean="0"/>
+              <a:rPr lang="en-US"/>
               <a:t>Third level</a:t>
             </a:r>
           </a:p>
           <a:p>
             <a:pPr lvl="3"/>
             <a:r>
-              <a:rPr lang="en-US" smtClean="0"/>
+              <a:rPr lang="en-US"/>
               <a:t>Fourth level</a:t>
             </a:r>
           </a:p>
           <a:p>
             <a:pPr lvl="4"/>
             <a:r>
-              <a:rPr lang="en-US" smtClean="0"/>
+              <a:rPr lang="en-US"/>
               <a:t>Fifth level</a:t>
             </a:r>
-            <a:endParaRPr lang="en-US"/>
           </a:p>
         </p:txBody>
       </p:sp>
@@ -1184,38 +1178,37 @@
           <a:p>
             <a:pPr lvl="0"/>
             <a:r>
-              <a:rPr lang="en-US" smtClean="0"/>
+              <a:rPr lang="en-US"/>
               <a:t>Click to edit Master text styles</a:t>
             </a:r>
           </a:p>
           <a:p>
             <a:pPr lvl="1"/>
             <a:r>
-              <a:rPr lang="en-US" smtClean="0"/>
+              <a:rPr lang="en-US"/>
               <a:t>Second level</a:t>
             </a:r>
           </a:p>
           <a:p>
             <a:pPr lvl="2"/>
             <a:r>
-              <a:rPr lang="en-US" smtClean="0"/>
+              <a:rPr lang="en-US"/>
               <a:t>Third level</a:t>
             </a:r>
           </a:p>
           <a:p>
             <a:pPr lvl="3"/>
             <a:r>
-              <a:rPr lang="en-US" smtClean="0"/>
+              <a:rPr lang="en-US"/>
               <a:t>Fourth level</a:t>
             </a:r>
           </a:p>
           <a:p>
             <a:pPr lvl="4"/>
             <a:r>
-              <a:rPr lang="en-US" smtClean="0"/>
+              <a:rPr lang="en-US"/>
               <a:t>Fifth level</a:t>
             </a:r>
-            <a:endParaRPr lang="en-US"/>
           </a:p>
         </p:txBody>
       </p:sp>
@@ -1236,7 +1229,7 @@
           <a:p>
             <a:fld id="{07B49D9B-B35E-094A-87A6-0FB71602174F}" type="datetimeFigureOut">
               <a:rPr lang="en-US" smtClean="0"/>
-              <a:t>6/24/18</a:t>
+              <a:t>6/25/18</a:t>
             </a:fld>
             <a:endParaRPr lang="en-US"/>
           </a:p>
@@ -1335,10 +1328,9 @@
           <a:lstStyle/>
           <a:p>
             <a:r>
-              <a:rPr lang="en-US" smtClean="0"/>
+              <a:rPr lang="en-US"/>
               <a:t>Click to edit Master title style</a:t>
             </a:r>
-            <a:endParaRPr lang="en-US"/>
           </a:p>
         </p:txBody>
       </p:sp>
@@ -1401,7 +1393,7 @@
           <a:p>
             <a:pPr lvl="0"/>
             <a:r>
-              <a:rPr lang="en-US" smtClean="0"/>
+              <a:rPr lang="en-US"/>
               <a:t>Click to edit Master text styles</a:t>
             </a:r>
           </a:p>
@@ -1429,38 +1421,37 @@
           <a:p>
             <a:pPr lvl="0"/>
             <a:r>
-              <a:rPr lang="en-US" smtClean="0"/>
+              <a:rPr lang="en-US"/>
               <a:t>Click to edit Master text styles</a:t>
             </a:r>
           </a:p>
           <a:p>
             <a:pPr lvl="1"/>
             <a:r>
-              <a:rPr lang="en-US" smtClean="0"/>
+              <a:rPr lang="en-US"/>
               <a:t>Second level</a:t>
             </a:r>
           </a:p>
           <a:p>
             <a:pPr lvl="2"/>
             <a:r>
-              <a:rPr lang="en-US" smtClean="0"/>
+              <a:rPr lang="en-US"/>
               <a:t>Third level</a:t>
             </a:r>
           </a:p>
           <a:p>
             <a:pPr lvl="3"/>
             <a:r>
-              <a:rPr lang="en-US" smtClean="0"/>
+              <a:rPr lang="en-US"/>
               <a:t>Fourth level</a:t>
             </a:r>
           </a:p>
           <a:p>
             <a:pPr lvl="4"/>
             <a:r>
-              <a:rPr lang="en-US" smtClean="0"/>
+              <a:rPr lang="en-US"/>
               <a:t>Fifth level</a:t>
             </a:r>
-            <a:endParaRPr lang="en-US"/>
           </a:p>
         </p:txBody>
       </p:sp>
@@ -1523,7 +1514,7 @@
           <a:p>
             <a:pPr lvl="0"/>
             <a:r>
-              <a:rPr lang="en-US" smtClean="0"/>
+              <a:rPr lang="en-US"/>
               <a:t>Click to edit Master text styles</a:t>
             </a:r>
           </a:p>
@@ -1551,38 +1542,37 @@
           <a:p>
             <a:pPr lvl="0"/>
             <a:r>
-              <a:rPr lang="en-US" smtClean="0"/>
+              <a:rPr lang="en-US"/>
               <a:t>Click to edit Master text styles</a:t>
             </a:r>
           </a:p>
           <a:p>
             <a:pPr lvl="1"/>
             <a:r>
-              <a:rPr lang="en-US" smtClean="0"/>
+              <a:rPr lang="en-US"/>
               <a:t>Second level</a:t>
             </a:r>
           </a:p>
           <a:p>
             <a:pPr lvl="2"/>
             <a:r>
-              <a:rPr lang="en-US" smtClean="0"/>
+              <a:rPr lang="en-US"/>
               <a:t>Third level</a:t>
             </a:r>
           </a:p>
           <a:p>
             <a:pPr lvl="3"/>
             <a:r>
-              <a:rPr lang="en-US" smtClean="0"/>
+              <a:rPr lang="en-US"/>
               <a:t>Fourth level</a:t>
             </a:r>
           </a:p>
           <a:p>
             <a:pPr lvl="4"/>
             <a:r>
-              <a:rPr lang="en-US" smtClean="0"/>
+              <a:rPr lang="en-US"/>
               <a:t>Fifth level</a:t>
             </a:r>
-            <a:endParaRPr lang="en-US"/>
           </a:p>
         </p:txBody>
       </p:sp>
@@ -1603,7 +1593,7 @@
           <a:p>
             <a:fld id="{07B49D9B-B35E-094A-87A6-0FB71602174F}" type="datetimeFigureOut">
               <a:rPr lang="en-US" smtClean="0"/>
-              <a:t>6/24/18</a:t>
+              <a:t>6/25/18</a:t>
             </a:fld>
             <a:endParaRPr lang="en-US"/>
           </a:p>
@@ -1697,10 +1687,9 @@
           <a:lstStyle/>
           <a:p>
             <a:r>
-              <a:rPr lang="en-US" smtClean="0"/>
+              <a:rPr lang="en-US"/>
               <a:t>Click to edit Master title style</a:t>
             </a:r>
-            <a:endParaRPr lang="en-US"/>
           </a:p>
         </p:txBody>
       </p:sp>
@@ -1721,7 +1710,7 @@
           <a:p>
             <a:fld id="{07B49D9B-B35E-094A-87A6-0FB71602174F}" type="datetimeFigureOut">
               <a:rPr lang="en-US" smtClean="0"/>
-              <a:t>6/24/18</a:t>
+              <a:t>6/25/18</a:t>
             </a:fld>
             <a:endParaRPr lang="en-US"/>
           </a:p>
@@ -1816,7 +1805,7 @@
           <a:p>
             <a:fld id="{07B49D9B-B35E-094A-87A6-0FB71602174F}" type="datetimeFigureOut">
               <a:rPr lang="en-US" smtClean="0"/>
-              <a:t>6/24/18</a:t>
+              <a:t>6/25/18</a:t>
             </a:fld>
             <a:endParaRPr lang="en-US"/>
           </a:p>
@@ -1919,10 +1908,9 @@
           </a:lstStyle>
           <a:p>
             <a:r>
-              <a:rPr lang="en-US" smtClean="0"/>
+              <a:rPr lang="en-US"/>
               <a:t>Click to edit Master title style</a:t>
             </a:r>
-            <a:endParaRPr lang="en-US"/>
           </a:p>
         </p:txBody>
       </p:sp>
@@ -1976,38 +1964,37 @@
           <a:p>
             <a:pPr lvl="0"/>
             <a:r>
-              <a:rPr lang="en-US" smtClean="0"/>
+              <a:rPr lang="en-US"/>
               <a:t>Click to edit Master text styles</a:t>
             </a:r>
           </a:p>
           <a:p>
             <a:pPr lvl="1"/>
             <a:r>
-              <a:rPr lang="en-US" smtClean="0"/>
+              <a:rPr lang="en-US"/>
               <a:t>Second level</a:t>
             </a:r>
           </a:p>
           <a:p>
             <a:pPr lvl="2"/>
             <a:r>
-              <a:rPr lang="en-US" smtClean="0"/>
+              <a:rPr lang="en-US"/>
               <a:t>Third level</a:t>
             </a:r>
           </a:p>
           <a:p>
             <a:pPr lvl="3"/>
             <a:r>
-              <a:rPr lang="en-US" smtClean="0"/>
+              <a:rPr lang="en-US"/>
               <a:t>Fourth level</a:t>
             </a:r>
           </a:p>
           <a:p>
             <a:pPr lvl="4"/>
             <a:r>
-              <a:rPr lang="en-US" smtClean="0"/>
+              <a:rPr lang="en-US"/>
               <a:t>Fifth level</a:t>
             </a:r>
-            <a:endParaRPr lang="en-US"/>
           </a:p>
         </p:txBody>
       </p:sp>
@@ -2070,7 +2057,7 @@
           <a:p>
             <a:pPr lvl="0"/>
             <a:r>
-              <a:rPr lang="en-US" smtClean="0"/>
+              <a:rPr lang="en-US"/>
               <a:t>Click to edit Master text styles</a:t>
             </a:r>
           </a:p>
@@ -2093,7 +2080,7 @@
           <a:p>
             <a:fld id="{07B49D9B-B35E-094A-87A6-0FB71602174F}" type="datetimeFigureOut">
               <a:rPr lang="en-US" smtClean="0"/>
-              <a:t>6/24/18</a:t>
+              <a:t>6/25/18</a:t>
             </a:fld>
             <a:endParaRPr lang="en-US"/>
           </a:p>
@@ -2196,10 +2183,9 @@
           </a:lstStyle>
           <a:p>
             <a:r>
-              <a:rPr lang="en-US" smtClean="0"/>
+              <a:rPr lang="en-US"/>
               <a:t>Click to edit Master title style</a:t>
             </a:r>
-            <a:endParaRPr lang="en-US"/>
           </a:p>
         </p:txBody>
       </p:sp>
@@ -2323,7 +2309,7 @@
           <a:p>
             <a:pPr lvl="0"/>
             <a:r>
-              <a:rPr lang="en-US" smtClean="0"/>
+              <a:rPr lang="en-US"/>
               <a:t>Click to edit Master text styles</a:t>
             </a:r>
           </a:p>
@@ -2346,7 +2332,7 @@
           <a:p>
             <a:fld id="{07B49D9B-B35E-094A-87A6-0FB71602174F}" type="datetimeFigureOut">
               <a:rPr lang="en-US" smtClean="0"/>
-              <a:t>6/24/18</a:t>
+              <a:t>6/25/18</a:t>
             </a:fld>
             <a:endParaRPr lang="en-US"/>
           </a:p>
@@ -2455,10 +2441,9 @@
           <a:lstStyle/>
           <a:p>
             <a:r>
-              <a:rPr lang="en-US" smtClean="0"/>
+              <a:rPr lang="en-US"/>
               <a:t>Click to edit Master title style</a:t>
             </a:r>
-            <a:endParaRPr lang="en-US"/>
           </a:p>
         </p:txBody>
       </p:sp>
@@ -2489,38 +2474,37 @@
           <a:p>
             <a:pPr lvl="0"/>
             <a:r>
-              <a:rPr lang="en-US" smtClean="0"/>
+              <a:rPr lang="en-US"/>
               <a:t>Click to edit Master text styles</a:t>
             </a:r>
           </a:p>
           <a:p>
             <a:pPr lvl="1"/>
             <a:r>
-              <a:rPr lang="en-US" smtClean="0"/>
+              <a:rPr lang="en-US"/>
               <a:t>Second level</a:t>
             </a:r>
           </a:p>
           <a:p>
             <a:pPr lvl="2"/>
             <a:r>
-              <a:rPr lang="en-US" smtClean="0"/>
+              <a:rPr lang="en-US"/>
               <a:t>Third level</a:t>
             </a:r>
           </a:p>
           <a:p>
             <a:pPr lvl="3"/>
             <a:r>
-              <a:rPr lang="en-US" smtClean="0"/>
+              <a:rPr lang="en-US"/>
               <a:t>Fourth level</a:t>
             </a:r>
           </a:p>
           <a:p>
             <a:pPr lvl="4"/>
             <a:r>
-              <a:rPr lang="en-US" smtClean="0"/>
+              <a:rPr lang="en-US"/>
               <a:t>Fifth level</a:t>
             </a:r>
-            <a:endParaRPr lang="en-US"/>
           </a:p>
         </p:txBody>
       </p:sp>
@@ -2559,7 +2543,7 @@
           <a:p>
             <a:fld id="{07B49D9B-B35E-094A-87A6-0FB71602174F}" type="datetimeFigureOut">
               <a:rPr lang="en-US" smtClean="0"/>
-              <a:t>6/24/18</a:t>
+              <a:t>6/25/18</a:t>
             </a:fld>
             <a:endParaRPr lang="en-US"/>
           </a:p>
@@ -2973,7 +2957,7 @@
         <p:spPr>
           <a:xfrm>
             <a:off x="1799789" y="1343661"/>
-            <a:ext cx="1139687" cy="830997"/>
+            <a:ext cx="1139687" cy="646331"/>
           </a:xfrm>
           <a:prstGeom prst="rect">
             <a:avLst/>
@@ -3001,18 +2985,13 @@
           <a:p>
             <a:pPr algn="ctr"/>
             <a:r>
-              <a:rPr lang="en-US" sz="2400" dirty="0" smtClean="0">
+              <a:rPr lang="en-US" dirty="0">
                 <a:latin typeface="Verdana" charset="0"/>
                 <a:ea typeface="Verdana" charset="0"/>
                 <a:cs typeface="Verdana" charset="0"/>
               </a:rPr>
               <a:t>Water Pump</a:t>
             </a:r>
-            <a:endParaRPr lang="en-US" sz="2400" dirty="0">
-              <a:latin typeface="Verdana" charset="0"/>
-              <a:ea typeface="Verdana" charset="0"/>
-              <a:cs typeface="Verdana" charset="0"/>
-            </a:endParaRPr>
           </a:p>
         </p:txBody>
       </p:sp>
@@ -3025,7 +3004,7 @@
         <p:spPr>
           <a:xfrm>
             <a:off x="3892684" y="1344744"/>
-            <a:ext cx="1775791" cy="830997"/>
+            <a:ext cx="1775791" cy="646331"/>
           </a:xfrm>
           <a:prstGeom prst="rect">
             <a:avLst/>
@@ -3053,18 +3032,13 @@
           <a:p>
             <a:pPr algn="ctr"/>
             <a:r>
-              <a:rPr lang="en-US" sz="2400" dirty="0" smtClean="0">
+              <a:rPr lang="en-US" dirty="0">
                 <a:latin typeface="Verdana" charset="0"/>
                 <a:ea typeface="Verdana" charset="0"/>
                 <a:cs typeface="Verdana" charset="0"/>
               </a:rPr>
               <a:t>Coagulant Pump</a:t>
             </a:r>
-            <a:endParaRPr lang="en-US" sz="2400" dirty="0">
-              <a:latin typeface="Verdana" charset="0"/>
-              <a:ea typeface="Verdana" charset="0"/>
-              <a:cs typeface="Verdana" charset="0"/>
-            </a:endParaRPr>
           </a:p>
         </p:txBody>
       </p:sp>
@@ -3077,7 +3051,7 @@
         <p:spPr>
           <a:xfrm>
             <a:off x="6555651" y="1346321"/>
-            <a:ext cx="1139687" cy="830997"/>
+            <a:ext cx="1139687" cy="646331"/>
           </a:xfrm>
           <a:prstGeom prst="rect">
             <a:avLst/>
@@ -3105,18 +3079,13 @@
           <a:p>
             <a:pPr algn="ctr"/>
             <a:r>
-              <a:rPr lang="en-US" sz="2400" dirty="0" smtClean="0">
+              <a:rPr lang="en-US" dirty="0">
                 <a:latin typeface="Verdana" charset="0"/>
                 <a:ea typeface="Verdana" charset="0"/>
                 <a:cs typeface="Verdana" charset="0"/>
               </a:rPr>
               <a:t>Waste Pump</a:t>
             </a:r>
-            <a:endParaRPr lang="en-US" sz="2400" dirty="0">
-              <a:latin typeface="Verdana" charset="0"/>
-              <a:ea typeface="Verdana" charset="0"/>
-              <a:cs typeface="Verdana" charset="0"/>
-            </a:endParaRPr>
           </a:p>
         </p:txBody>
       </p:sp>
@@ -3129,7 +3098,7 @@
         <p:spPr>
           <a:xfrm>
             <a:off x="1799788" y="304472"/>
-            <a:ext cx="1139687" cy="707886"/>
+            <a:ext cx="1139687" cy="646331"/>
           </a:xfrm>
           <a:prstGeom prst="rect">
             <a:avLst/>
@@ -3157,18 +3126,13 @@
           <a:p>
             <a:pPr algn="ctr"/>
             <a:r>
-              <a:rPr lang="en-US" sz="2000" dirty="0" smtClean="0">
+              <a:rPr lang="en-US" dirty="0">
                 <a:latin typeface="Verdana" charset="0"/>
                 <a:ea typeface="Verdana" charset="0"/>
                 <a:cs typeface="Verdana" charset="0"/>
               </a:rPr>
               <a:t>Water Stream</a:t>
             </a:r>
-            <a:endParaRPr lang="en-US" sz="2000" dirty="0">
-              <a:latin typeface="Verdana" charset="0"/>
-              <a:ea typeface="Verdana" charset="0"/>
-              <a:cs typeface="Verdana" charset="0"/>
-            </a:endParaRPr>
           </a:p>
         </p:txBody>
       </p:sp>
@@ -3181,7 +3145,7 @@
         <p:spPr>
           <a:xfrm>
             <a:off x="4003669" y="311060"/>
-            <a:ext cx="1553819" cy="707886"/>
+            <a:ext cx="1553819" cy="646331"/>
           </a:xfrm>
           <a:prstGeom prst="rect">
             <a:avLst/>
@@ -3209,18 +3173,13 @@
           <a:p>
             <a:pPr algn="ctr"/>
             <a:r>
-              <a:rPr lang="en-US" sz="2000" dirty="0" smtClean="0">
+              <a:rPr lang="en-US" dirty="0">
                 <a:latin typeface="Verdana" charset="0"/>
                 <a:ea typeface="Verdana" charset="0"/>
                 <a:cs typeface="Verdana" charset="0"/>
               </a:rPr>
               <a:t>Coagulant Stock</a:t>
             </a:r>
-            <a:endParaRPr lang="en-US" sz="2000" dirty="0">
-              <a:latin typeface="Verdana" charset="0"/>
-              <a:ea typeface="Verdana" charset="0"/>
-              <a:cs typeface="Verdana" charset="0"/>
-            </a:endParaRPr>
           </a:p>
         </p:txBody>
       </p:sp>
@@ -3233,7 +3192,7 @@
         <p:spPr>
           <a:xfrm>
             <a:off x="314913" y="1333278"/>
-            <a:ext cx="1139687" cy="830997"/>
+            <a:ext cx="1139687" cy="646331"/>
           </a:xfrm>
           <a:prstGeom prst="rect">
             <a:avLst/>
@@ -3261,18 +3220,13 @@
           <a:p>
             <a:pPr algn="ctr"/>
             <a:r>
-              <a:rPr lang="en-US" sz="2400" dirty="0" smtClean="0">
+              <a:rPr lang="en-US" dirty="0">
                 <a:latin typeface="Verdana" charset="0"/>
                 <a:ea typeface="Verdana" charset="0"/>
                 <a:cs typeface="Verdana" charset="0"/>
               </a:rPr>
               <a:t>Clay Pump</a:t>
             </a:r>
-            <a:endParaRPr lang="en-US" sz="2400" dirty="0">
-              <a:latin typeface="Verdana" charset="0"/>
-              <a:ea typeface="Verdana" charset="0"/>
-              <a:cs typeface="Verdana" charset="0"/>
-            </a:endParaRPr>
           </a:p>
         </p:txBody>
       </p:sp>
@@ -3285,7 +3239,7 @@
         <p:spPr>
           <a:xfrm>
             <a:off x="207217" y="311060"/>
-            <a:ext cx="1346754" cy="707886"/>
+            <a:ext cx="1346754" cy="646331"/>
           </a:xfrm>
           <a:prstGeom prst="rect">
             <a:avLst/>
@@ -3313,18 +3267,13 @@
           <a:p>
             <a:pPr algn="ctr"/>
             <a:r>
-              <a:rPr lang="en-US" sz="2000" dirty="0" smtClean="0">
+              <a:rPr lang="en-US" dirty="0">
                 <a:latin typeface="Verdana" charset="0"/>
                 <a:ea typeface="Verdana" charset="0"/>
                 <a:cs typeface="Verdana" charset="0"/>
               </a:rPr>
               <a:t>Clay Stock</a:t>
             </a:r>
-            <a:endParaRPr lang="en-US" sz="2000" dirty="0">
-              <a:latin typeface="Verdana" charset="0"/>
-              <a:ea typeface="Verdana" charset="0"/>
-              <a:cs typeface="Verdana" charset="0"/>
-            </a:endParaRPr>
           </a:p>
         </p:txBody>
       </p:sp>
@@ -3368,18 +3317,13 @@
           <a:p>
             <a:pPr algn="ctr"/>
             <a:r>
-              <a:rPr lang="en-US" dirty="0" smtClean="0">
+              <a:rPr lang="en-US" dirty="0">
                 <a:latin typeface="Verdana" charset="0"/>
                 <a:ea typeface="Verdana" charset="0"/>
                 <a:cs typeface="Verdana" charset="0"/>
               </a:rPr>
               <a:t>Pressure Attenuator</a:t>
             </a:r>
-            <a:endParaRPr lang="en-US" dirty="0">
-              <a:latin typeface="Verdana" charset="0"/>
-              <a:ea typeface="Verdana" charset="0"/>
-              <a:cs typeface="Verdana" charset="0"/>
-            </a:endParaRPr>
           </a:p>
         </p:txBody>
       </p:sp>
@@ -3391,7 +3335,7 @@
         </p:nvSpPr>
         <p:spPr>
           <a:xfrm>
-            <a:off x="1537227" y="5761551"/>
+            <a:off x="1537227" y="6047987"/>
             <a:ext cx="1664806" cy="646331"/>
           </a:xfrm>
           <a:prstGeom prst="rect">
@@ -3420,18 +3364,13 @@
           <a:p>
             <a:pPr algn="ctr"/>
             <a:r>
-              <a:rPr lang="en-US" dirty="0" smtClean="0">
+              <a:rPr lang="en-US" dirty="0">
                 <a:latin typeface="Verdana" charset="0"/>
                 <a:ea typeface="Verdana" charset="0"/>
                 <a:cs typeface="Verdana" charset="0"/>
               </a:rPr>
               <a:t>Influent Turbidimeter</a:t>
             </a:r>
-            <a:endParaRPr lang="en-US" dirty="0">
-              <a:latin typeface="Verdana" charset="0"/>
-              <a:ea typeface="Verdana" charset="0"/>
-              <a:cs typeface="Verdana" charset="0"/>
-            </a:endParaRPr>
           </a:p>
         </p:txBody>
       </p:sp>
@@ -3444,7 +3383,7 @@
         <p:spPr>
           <a:xfrm>
             <a:off x="7369835" y="304472"/>
-            <a:ext cx="1139687" cy="707886"/>
+            <a:ext cx="1139687" cy="646331"/>
           </a:xfrm>
           <a:prstGeom prst="rect">
             <a:avLst/>
@@ -3472,18 +3411,13 @@
           <a:p>
             <a:pPr algn="ctr"/>
             <a:r>
-              <a:rPr lang="en-US" sz="2000" dirty="0" smtClean="0">
+              <a:rPr lang="en-US" dirty="0">
                 <a:latin typeface="Verdana" charset="0"/>
                 <a:ea typeface="Verdana" charset="0"/>
                 <a:cs typeface="Verdana" charset="0"/>
               </a:rPr>
               <a:t>Waste Stream</a:t>
             </a:r>
-            <a:endParaRPr lang="en-US" sz="2000" dirty="0">
-              <a:latin typeface="Verdana" charset="0"/>
-              <a:ea typeface="Verdana" charset="0"/>
-              <a:cs typeface="Verdana" charset="0"/>
-            </a:endParaRPr>
           </a:p>
         </p:txBody>
       </p:sp>
@@ -3495,7 +3429,7 @@
         </p:nvSpPr>
         <p:spPr>
           <a:xfrm>
-            <a:off x="7145912" y="4548463"/>
+            <a:off x="7110212" y="4536581"/>
             <a:ext cx="1664806" cy="646331"/>
           </a:xfrm>
           <a:prstGeom prst="rect">
@@ -3524,18 +3458,13 @@
           <a:p>
             <a:pPr algn="ctr"/>
             <a:r>
-              <a:rPr lang="en-US" dirty="0" smtClean="0">
+              <a:rPr lang="en-US" dirty="0">
                 <a:latin typeface="Verdana" charset="0"/>
                 <a:ea typeface="Verdana" charset="0"/>
                 <a:cs typeface="Verdana" charset="0"/>
               </a:rPr>
               <a:t>Effluent Turbidimeter</a:t>
             </a:r>
-            <a:endParaRPr lang="en-US" dirty="0">
-              <a:latin typeface="Verdana" charset="0"/>
-              <a:ea typeface="Verdana" charset="0"/>
-              <a:cs typeface="Verdana" charset="0"/>
-            </a:endParaRPr>
           </a:p>
         </p:txBody>
       </p:sp>
@@ -3550,15 +3479,15 @@
         </p:nvCxnSpPr>
         <p:spPr>
           <a:xfrm>
-            <a:off x="2369632" y="1012358"/>
-            <a:ext cx="1" cy="331303"/>
+            <a:off x="2369632" y="950803"/>
+            <a:ext cx="1" cy="392858"/>
           </a:xfrm>
           <a:prstGeom prst="straightConnector1">
             <a:avLst/>
           </a:prstGeom>
-          <a:ln w="28575">
+          <a:ln w="38100">
             <a:solidFill>
-              <a:schemeClr val="tx1"/>
+              <a:srgbClr val="FF0000"/>
             </a:solidFill>
             <a:tailEnd type="triangle" w="lg" len="lg"/>
           </a:ln>
@@ -3589,15 +3518,15 @@
         </p:nvCxnSpPr>
         <p:spPr>
           <a:xfrm flipH="1">
-            <a:off x="2369632" y="2174658"/>
-            <a:ext cx="1" cy="2029656"/>
+            <a:off x="2369632" y="1989992"/>
+            <a:ext cx="1" cy="2214322"/>
           </a:xfrm>
           <a:prstGeom prst="straightConnector1">
             <a:avLst/>
           </a:prstGeom>
-          <a:ln w="28575">
+          <a:ln w="38100">
             <a:solidFill>
-              <a:schemeClr val="tx1"/>
+              <a:srgbClr val="FF0000"/>
             </a:solidFill>
             <a:headEnd w="med" len="med"/>
             <a:tailEnd type="triangle" w="lg" len="lg"/>
@@ -3626,7 +3555,7 @@
         </p:nvCxnSpPr>
         <p:spPr>
           <a:xfrm>
-            <a:off x="2369630" y="3955142"/>
+            <a:off x="2379249" y="3620493"/>
             <a:ext cx="1215306" cy="0"/>
           </a:xfrm>
           <a:prstGeom prst="straightConnector1">
@@ -3664,7 +3593,7 @@
         <p:spPr>
           <a:xfrm>
             <a:off x="3892684" y="2837819"/>
-            <a:ext cx="1884099" cy="461665"/>
+            <a:ext cx="1884099" cy="369332"/>
           </a:xfrm>
           <a:prstGeom prst="rect">
             <a:avLst/>
@@ -3695,18 +3624,13 @@
           <a:p>
             <a:pPr algn="ctr"/>
             <a:r>
-              <a:rPr lang="en-US" sz="2400" dirty="0" smtClean="0">
+              <a:rPr lang="en-US" dirty="0">
                 <a:latin typeface="Verdana" charset="0"/>
                 <a:ea typeface="Verdana" charset="0"/>
                 <a:cs typeface="Verdana" charset="0"/>
               </a:rPr>
               <a:t>Flocculator</a:t>
             </a:r>
-            <a:endParaRPr lang="en-US" sz="2200" dirty="0">
-              <a:latin typeface="Verdana" charset="0"/>
-              <a:ea typeface="Verdana" charset="0"/>
-              <a:cs typeface="Verdana" charset="0"/>
-            </a:endParaRPr>
           </a:p>
         </p:txBody>
       </p:sp>
@@ -3721,15 +3645,15 @@
         </p:nvCxnSpPr>
         <p:spPr>
           <a:xfrm>
-            <a:off x="880594" y="1018946"/>
-            <a:ext cx="4163" cy="314332"/>
+            <a:off x="880594" y="957391"/>
+            <a:ext cx="4163" cy="375887"/>
           </a:xfrm>
           <a:prstGeom prst="straightConnector1">
             <a:avLst/>
           </a:prstGeom>
-          <a:ln w="28575">
+          <a:ln w="38100">
             <a:solidFill>
-              <a:schemeClr val="tx1"/>
+              <a:srgbClr val="FF0000"/>
             </a:solidFill>
             <a:tailEnd type="triangle" w="lg" len="lg"/>
           </a:ln>
@@ -3760,8 +3684,8 @@
         </p:nvCxnSpPr>
         <p:spPr>
           <a:xfrm>
-            <a:off x="4780579" y="1018946"/>
-            <a:ext cx="1" cy="325798"/>
+            <a:off x="4780579" y="957391"/>
+            <a:ext cx="1" cy="387353"/>
           </a:xfrm>
           <a:prstGeom prst="straightConnector1">
             <a:avLst/>
@@ -3792,22 +3716,23 @@
         <p:nvCxnSpPr>
           <p:cNvPr id="47" name="Straight Arrow Connector 46"/>
           <p:cNvCxnSpPr>
-            <a:stCxn id="25" idx="0"/>
+            <a:cxnSpLocks/>
+            <a:stCxn id="203" idx="1"/>
             <a:endCxn id="24" idx="2"/>
           </p:cNvCxnSpPr>
           <p:nvPr/>
         </p:nvCxnSpPr>
         <p:spPr>
           <a:xfrm flipH="1" flipV="1">
-            <a:off x="7939679" y="1012358"/>
-            <a:ext cx="38636" cy="3536105"/>
+            <a:off x="7939679" y="950803"/>
+            <a:ext cx="5873" cy="3052607"/>
           </a:xfrm>
           <a:prstGeom prst="straightConnector1">
             <a:avLst/>
           </a:prstGeom>
-          <a:ln w="28575">
+          <a:ln w="38100">
             <a:solidFill>
-              <a:schemeClr val="tx1"/>
+              <a:srgbClr val="FF0000"/>
             </a:solidFill>
             <a:tailEnd type="triangle" w="lg" len="lg"/>
           </a:ln>
@@ -3839,14 +3764,14 @@
         <p:spPr>
           <a:xfrm flipH="1">
             <a:off x="2369630" y="4850645"/>
-            <a:ext cx="2" cy="910906"/>
+            <a:ext cx="2" cy="1197342"/>
           </a:xfrm>
           <a:prstGeom prst="straightConnector1">
             <a:avLst/>
           </a:prstGeom>
-          <a:ln w="28575">
+          <a:ln w="38100">
             <a:solidFill>
-              <a:schemeClr val="tx1"/>
+              <a:srgbClr val="FF0000"/>
             </a:solidFill>
             <a:headEnd w="med" len="med"/>
             <a:tailEnd type="triangle" w="lg" len="lg"/>
@@ -3875,7 +3800,7 @@
         </p:nvSpPr>
         <p:spPr>
           <a:xfrm>
-            <a:off x="2475186" y="3590189"/>
+            <a:off x="2484295" y="3177610"/>
             <a:ext cx="995785" cy="307777"/>
           </a:xfrm>
           <a:prstGeom prst="rect">
@@ -3890,7 +3815,7 @@
           <a:lstStyle/>
           <a:p>
             <a:r>
-              <a:rPr lang="en-US" sz="1400" dirty="0" smtClean="0">
+              <a:rPr lang="en-US" sz="1400" dirty="0">
                 <a:latin typeface="Verdana" charset="0"/>
                 <a:ea typeface="Verdana" charset="0"/>
                 <a:cs typeface="Verdana" charset="0"/>
@@ -3927,8 +3852,8 @@
           </p:nvSpPr>
           <p:spPr>
             <a:xfrm>
-              <a:off x="10308619" y="2593993"/>
-              <a:ext cx="523220" cy="3662681"/>
+              <a:off x="10370174" y="2593993"/>
+              <a:ext cx="461665" cy="3662681"/>
             </a:xfrm>
             <a:prstGeom prst="rect">
               <a:avLst/>
@@ -3959,18 +3884,13 @@
             <a:p>
               <a:pPr algn="ctr"/>
               <a:r>
-                <a:rPr lang="en-US" sz="2200" dirty="0" smtClean="0">
+                <a:rPr lang="en-US" dirty="0">
                   <a:latin typeface="Verdana" charset="0"/>
                   <a:ea typeface="Verdana" charset="0"/>
                   <a:cs typeface="Verdana" charset="0"/>
                 </a:rPr>
                 <a:t>Sedimentation Tank</a:t>
               </a:r>
-              <a:endParaRPr lang="en-US" sz="2200" dirty="0">
-                <a:latin typeface="Verdana" charset="0"/>
-                <a:ea typeface="Verdana" charset="0"/>
-                <a:cs typeface="Verdana" charset="0"/>
-              </a:endParaRPr>
             </a:p>
           </p:txBody>
         </p:sp>
@@ -3982,8 +3902,8 @@
           </p:nvSpPr>
           <p:spPr>
             <a:xfrm rot="12757812">
-              <a:off x="9321557" y="2363054"/>
-              <a:ext cx="523220" cy="2195456"/>
+              <a:off x="9352334" y="2363054"/>
+              <a:ext cx="461665" cy="2195456"/>
             </a:xfrm>
             <a:prstGeom prst="rect">
               <a:avLst/>
@@ -4014,18 +3934,13 @@
             <a:p>
               <a:pPr algn="ctr"/>
               <a:r>
-                <a:rPr lang="en-US" sz="2200" dirty="0" smtClean="0">
+                <a:rPr lang="en-US" dirty="0">
                   <a:latin typeface="Verdana" charset="0"/>
                   <a:ea typeface="Verdana" charset="0"/>
                   <a:cs typeface="Verdana" charset="0"/>
                 </a:rPr>
                 <a:t>Floc Weir</a:t>
               </a:r>
-              <a:endParaRPr lang="en-US" sz="2200" dirty="0">
-                <a:latin typeface="Verdana" charset="0"/>
-                <a:ea typeface="Verdana" charset="0"/>
-                <a:cs typeface="Verdana" charset="0"/>
-              </a:endParaRPr>
             </a:p>
           </p:txBody>
         </p:sp>
@@ -5993,8 +5908,8 @@
         </p:nvSpPr>
         <p:spPr>
           <a:xfrm>
-            <a:off x="8810718" y="1338511"/>
-            <a:ext cx="727865" cy="3566910"/>
+            <a:off x="8789054" y="1338511"/>
+            <a:ext cx="749529" cy="3572328"/>
           </a:xfrm>
           <a:custGeom>
             <a:avLst/>
@@ -6999,13 +6914,15 @@
       <p:cxnSp>
         <p:nvCxnSpPr>
           <p:cNvPr id="149" name="Straight Arrow Connector 148"/>
-          <p:cNvCxnSpPr/>
+          <p:cNvCxnSpPr>
+            <a:cxnSpLocks/>
+          </p:cNvCxnSpPr>
           <p:nvPr/>
         </p:nvCxnSpPr>
         <p:spPr>
           <a:xfrm flipH="1">
-            <a:off x="7970850" y="4259090"/>
-            <a:ext cx="1060282" cy="0"/>
+            <a:off x="7942615" y="4259090"/>
+            <a:ext cx="1088517" cy="0"/>
           </a:xfrm>
           <a:prstGeom prst="straightConnector1">
             <a:avLst/>
@@ -7041,7 +6958,7 @@
         </p:nvSpPr>
         <p:spPr>
           <a:xfrm>
-            <a:off x="7980553" y="3882129"/>
+            <a:off x="8011629" y="3805375"/>
             <a:ext cx="995785" cy="307777"/>
           </a:xfrm>
           <a:prstGeom prst="rect">
@@ -7056,7 +6973,7 @@
           <a:lstStyle/>
           <a:p>
             <a:r>
-              <a:rPr lang="en-US" sz="1400" dirty="0" smtClean="0">
+              <a:rPr lang="en-US" sz="1400" dirty="0">
                 <a:latin typeface="Verdana" charset="0"/>
                 <a:ea typeface="Verdana" charset="0"/>
                 <a:cs typeface="Verdana" charset="0"/>
@@ -7080,7 +6997,7 @@
         <p:spPr>
           <a:xfrm>
             <a:off x="3199453" y="3086647"/>
-            <a:ext cx="704805" cy="2986607"/>
+            <a:ext cx="704805" cy="3343970"/>
           </a:xfrm>
           <a:custGeom>
             <a:avLst/>
@@ -7249,7 +7166,7 @@
         </p:nvSpPr>
         <p:spPr>
           <a:xfrm>
-            <a:off x="2484295" y="4889136"/>
+            <a:off x="2484295" y="4833040"/>
             <a:ext cx="995785" cy="307777"/>
           </a:xfrm>
           <a:prstGeom prst="rect">
@@ -7264,7 +7181,7 @@
           <a:lstStyle/>
           <a:p>
             <a:r>
-              <a:rPr lang="en-US" sz="1400" dirty="0" smtClean="0">
+              <a:rPr lang="en-US" sz="1400" dirty="0">
                 <a:latin typeface="Verdana" charset="0"/>
                 <a:ea typeface="Verdana" charset="0"/>
                 <a:cs typeface="Verdana" charset="0"/>
@@ -7283,14 +7200,14 @@
         <p:nvCxnSpPr>
           <p:cNvPr id="166" name="Straight Arrow Connector 165"/>
           <p:cNvCxnSpPr>
-            <a:stCxn id="14" idx="3"/>
+            <a:cxnSpLocks/>
           </p:cNvCxnSpPr>
           <p:nvPr/>
         </p:nvCxnSpPr>
         <p:spPr>
-          <a:xfrm flipV="1">
-            <a:off x="7695338" y="1759159"/>
-            <a:ext cx="240437" cy="2661"/>
+          <a:xfrm>
+            <a:off x="7695338" y="1759160"/>
+            <a:ext cx="240437" cy="0"/>
           </a:xfrm>
           <a:prstGeom prst="straightConnector1">
             <a:avLst/>
@@ -7355,18 +7272,13 @@
           <a:p>
             <a:pPr algn="ctr"/>
             <a:r>
-              <a:rPr lang="en-US" dirty="0" smtClean="0">
+              <a:rPr lang="en-US" dirty="0">
                 <a:latin typeface="Verdana" charset="0"/>
                 <a:ea typeface="Verdana" charset="0"/>
                 <a:cs typeface="Verdana" charset="0"/>
               </a:rPr>
               <a:t>Waste Tub</a:t>
             </a:r>
-            <a:endParaRPr lang="en-US" dirty="0">
-              <a:latin typeface="Verdana" charset="0"/>
-              <a:ea typeface="Verdana" charset="0"/>
-              <a:cs typeface="Verdana" charset="0"/>
-            </a:endParaRPr>
           </a:p>
         </p:txBody>
       </p:sp>
@@ -7416,7 +7328,7 @@
         </p:nvSpPr>
         <p:spPr>
           <a:xfrm>
-            <a:off x="3753689" y="3439049"/>
+            <a:off x="3758959" y="3345633"/>
             <a:ext cx="2116108" cy="369332"/>
           </a:xfrm>
           <a:prstGeom prst="rect">
@@ -7445,18 +7357,13 @@
           <a:p>
             <a:pPr algn="ctr"/>
             <a:r>
-              <a:rPr lang="en-US" dirty="0" smtClean="0">
+              <a:rPr lang="en-US" dirty="0">
                 <a:latin typeface="Verdana" charset="0"/>
                 <a:ea typeface="Verdana" charset="0"/>
                 <a:cs typeface="Verdana" charset="0"/>
               </a:rPr>
               <a:t>Pressure Sensor</a:t>
             </a:r>
-            <a:endParaRPr lang="en-US" dirty="0">
-              <a:latin typeface="Verdana" charset="0"/>
-              <a:ea typeface="Verdana" charset="0"/>
-              <a:cs typeface="Verdana" charset="0"/>
-            </a:endParaRPr>
           </a:p>
         </p:txBody>
       </p:sp>
@@ -7470,7 +7377,7 @@
         </p:nvCxnSpPr>
         <p:spPr>
           <a:xfrm>
-            <a:off x="3595019" y="3623715"/>
+            <a:off x="3600289" y="3530299"/>
             <a:ext cx="158670" cy="0"/>
           </a:xfrm>
           <a:prstGeom prst="line">
@@ -7505,7 +7412,7 @@
         </p:nvCxnSpPr>
         <p:spPr>
           <a:xfrm>
-            <a:off x="5875210" y="3623715"/>
+            <a:off x="5880480" y="3530299"/>
             <a:ext cx="175992" cy="0"/>
           </a:xfrm>
           <a:prstGeom prst="line">
@@ -7540,8 +7447,8 @@
         </p:nvSpPr>
         <p:spPr>
           <a:xfrm>
-            <a:off x="914172" y="2164276"/>
-            <a:ext cx="1445378" cy="3299618"/>
+            <a:off x="914172" y="1989992"/>
+            <a:ext cx="1445378" cy="3473902"/>
           </a:xfrm>
           <a:custGeom>
             <a:avLst/>
@@ -7589,9 +7496,9 @@
             </a:pathLst>
           </a:custGeom>
           <a:noFill/>
-          <a:ln w="28575">
+          <a:ln w="38100">
             <a:solidFill>
-              <a:schemeClr val="tx1"/>
+              <a:srgbClr val="FF0000"/>
             </a:solidFill>
             <a:tailEnd type="triangle" w="lg" len="lg"/>
           </a:ln>
@@ -7629,8 +7536,8 @@
         </p:nvSpPr>
         <p:spPr>
           <a:xfrm>
-            <a:off x="3595018" y="2169185"/>
-            <a:ext cx="1214108" cy="917462"/>
+            <a:off x="3595018" y="1987501"/>
+            <a:ext cx="1214108" cy="1099146"/>
           </a:xfrm>
           <a:custGeom>
             <a:avLst/>
@@ -7873,9 +7780,9 @@
             </a:pathLst>
           </a:custGeom>
           <a:noFill/>
-          <a:ln w="28575">
+          <a:ln w="38100">
             <a:solidFill>
-              <a:schemeClr val="tx1"/>
+              <a:srgbClr val="FF0000"/>
             </a:solidFill>
             <a:headEnd type="none" w="med" len="med"/>
             <a:tailEnd type="none" w="med" len="med"/>
@@ -7920,9 +7827,9 @@
           <a:prstGeom prst="line">
             <a:avLst/>
           </a:prstGeom>
-          <a:ln w="28575">
+          <a:ln w="38100">
             <a:solidFill>
-              <a:schemeClr val="tx1"/>
+              <a:srgbClr val="FF0000"/>
             </a:solidFill>
           </a:ln>
         </p:spPr>
@@ -7998,9 +7905,9 @@
             </a:pathLst>
           </a:custGeom>
           <a:noFill/>
-          <a:ln w="28575">
+          <a:ln w="38100">
             <a:solidFill>
-              <a:schemeClr val="tx1"/>
+              <a:srgbClr val="FF0000"/>
             </a:solidFill>
             <a:tailEnd type="triangle" w="lg" len="lg"/>
           </a:ln>
@@ -8053,7 +7960,7 @@
           <a:lstStyle/>
           <a:p>
             <a:r>
-              <a:rPr lang="en-US" sz="1400" dirty="0" smtClean="0">
+              <a:rPr lang="en-US" sz="1400" dirty="0">
                 <a:latin typeface="Verdana" charset="0"/>
                 <a:ea typeface="Verdana" charset="0"/>
                 <a:cs typeface="Verdana" charset="0"/>
@@ -8065,6 +7972,849 @@
               <a:ea typeface="Verdana" charset="0"/>
               <a:cs typeface="Verdana" charset="0"/>
             </a:endParaRPr>
+          </a:p>
+        </p:txBody>
+      </p:sp>
+      <p:sp>
+        <p:nvSpPr>
+          <p:cNvPr id="3" name="Oval 2">
+            <a:extLst>
+              <a:ext uri="{FF2B5EF4-FFF2-40B4-BE49-F238E27FC236}">
+                <a16:creationId xmlns:a16="http://schemas.microsoft.com/office/drawing/2014/main" id="{AA7A4266-2074-7147-9456-8E60474EB96C}"/>
+              </a:ext>
+            </a:extLst>
+          </p:cNvPr>
+          <p:cNvSpPr/>
+          <p:nvPr/>
+        </p:nvSpPr>
+        <p:spPr>
+          <a:xfrm>
+            <a:off x="2311605" y="3791387"/>
+            <a:ext cx="125434" cy="109123"/>
+          </a:xfrm>
+          <a:prstGeom prst="ellipse">
+            <a:avLst/>
+          </a:prstGeom>
+          <a:solidFill>
+            <a:schemeClr val="bg1"/>
+          </a:solidFill>
+          <a:ln w="19050">
+            <a:solidFill>
+              <a:srgbClr val="0432FF"/>
+            </a:solidFill>
+          </a:ln>
+        </p:spPr>
+        <p:style>
+          <a:lnRef idx="2">
+            <a:schemeClr val="accent1">
+              <a:shade val="50000"/>
+            </a:schemeClr>
+          </a:lnRef>
+          <a:fillRef idx="1">
+            <a:schemeClr val="accent1"/>
+          </a:fillRef>
+          <a:effectRef idx="0">
+            <a:schemeClr val="accent1"/>
+          </a:effectRef>
+          <a:fontRef idx="minor">
+            <a:schemeClr val="lt1"/>
+          </a:fontRef>
+        </p:style>
+        <p:txBody>
+          <a:bodyPr rtlCol="0" anchor="ctr"/>
+          <a:lstStyle/>
+          <a:p>
+            <a:pPr algn="ctr"/>
+            <a:endParaRPr lang="en-US" dirty="0"/>
+          </a:p>
+        </p:txBody>
+      </p:sp>
+      <p:sp>
+        <p:nvSpPr>
+          <p:cNvPr id="48" name="Oval 47">
+            <a:extLst>
+              <a:ext uri="{FF2B5EF4-FFF2-40B4-BE49-F238E27FC236}">
+                <a16:creationId xmlns:a16="http://schemas.microsoft.com/office/drawing/2014/main" id="{493FC27E-DB73-3A4D-9305-DE08DF2F2260}"/>
+              </a:ext>
+            </a:extLst>
+          </p:cNvPr>
+          <p:cNvSpPr/>
+          <p:nvPr/>
+        </p:nvSpPr>
+        <p:spPr>
+          <a:xfrm>
+            <a:off x="2873286" y="3580234"/>
+            <a:ext cx="125434" cy="109123"/>
+          </a:xfrm>
+          <a:prstGeom prst="ellipse">
+            <a:avLst/>
+          </a:prstGeom>
+          <a:solidFill>
+            <a:schemeClr val="bg1"/>
+          </a:solidFill>
+          <a:ln w="19050">
+            <a:solidFill>
+              <a:srgbClr val="0432FF"/>
+            </a:solidFill>
+          </a:ln>
+        </p:spPr>
+        <p:style>
+          <a:lnRef idx="2">
+            <a:schemeClr val="accent1">
+              <a:shade val="50000"/>
+            </a:schemeClr>
+          </a:lnRef>
+          <a:fillRef idx="1">
+            <a:schemeClr val="accent1"/>
+          </a:fillRef>
+          <a:effectRef idx="0">
+            <a:schemeClr val="accent1"/>
+          </a:effectRef>
+          <a:fontRef idx="minor">
+            <a:schemeClr val="lt1"/>
+          </a:fontRef>
+        </p:style>
+        <p:txBody>
+          <a:bodyPr rtlCol="0" anchor="ctr"/>
+          <a:lstStyle/>
+          <a:p>
+            <a:pPr algn="ctr"/>
+            <a:endParaRPr lang="en-US" dirty="0"/>
+          </a:p>
+        </p:txBody>
+      </p:sp>
+      <p:sp>
+        <p:nvSpPr>
+          <p:cNvPr id="49" name="Oval 48">
+            <a:extLst>
+              <a:ext uri="{FF2B5EF4-FFF2-40B4-BE49-F238E27FC236}">
+                <a16:creationId xmlns:a16="http://schemas.microsoft.com/office/drawing/2014/main" id="{9AD8515F-0B48-8642-874E-B716EA0E6F34}"/>
+              </a:ext>
+            </a:extLst>
+          </p:cNvPr>
+          <p:cNvSpPr/>
+          <p:nvPr/>
+        </p:nvSpPr>
+        <p:spPr>
+          <a:xfrm>
+            <a:off x="2878511" y="5199929"/>
+            <a:ext cx="125434" cy="109123"/>
+          </a:xfrm>
+          <a:prstGeom prst="ellipse">
+            <a:avLst/>
+          </a:prstGeom>
+          <a:solidFill>
+            <a:schemeClr val="bg1"/>
+          </a:solidFill>
+          <a:ln w="19050">
+            <a:solidFill>
+              <a:srgbClr val="0432FF"/>
+            </a:solidFill>
+          </a:ln>
+        </p:spPr>
+        <p:style>
+          <a:lnRef idx="2">
+            <a:schemeClr val="accent1">
+              <a:shade val="50000"/>
+            </a:schemeClr>
+          </a:lnRef>
+          <a:fillRef idx="1">
+            <a:schemeClr val="accent1"/>
+          </a:fillRef>
+          <a:effectRef idx="0">
+            <a:schemeClr val="accent1"/>
+          </a:effectRef>
+          <a:fontRef idx="minor">
+            <a:schemeClr val="lt1"/>
+          </a:fontRef>
+        </p:style>
+        <p:txBody>
+          <a:bodyPr rtlCol="0" anchor="ctr"/>
+          <a:lstStyle/>
+          <a:p>
+            <a:pPr algn="ctr"/>
+            <a:endParaRPr lang="en-US" dirty="0"/>
+          </a:p>
+        </p:txBody>
+      </p:sp>
+      <p:sp>
+        <p:nvSpPr>
+          <p:cNvPr id="51" name="Oval 50">
+            <a:extLst>
+              <a:ext uri="{FF2B5EF4-FFF2-40B4-BE49-F238E27FC236}">
+                <a16:creationId xmlns:a16="http://schemas.microsoft.com/office/drawing/2014/main" id="{3962512C-43BA-7647-8A05-FAD45E718949}"/>
+              </a:ext>
+            </a:extLst>
+          </p:cNvPr>
+          <p:cNvSpPr/>
+          <p:nvPr/>
+        </p:nvSpPr>
+        <p:spPr>
+          <a:xfrm>
+            <a:off x="3957258" y="5588570"/>
+            <a:ext cx="125434" cy="109123"/>
+          </a:xfrm>
+          <a:prstGeom prst="ellipse">
+            <a:avLst/>
+          </a:prstGeom>
+          <a:solidFill>
+            <a:schemeClr val="bg1"/>
+          </a:solidFill>
+          <a:ln w="19050">
+            <a:solidFill>
+              <a:srgbClr val="0432FF"/>
+            </a:solidFill>
+          </a:ln>
+        </p:spPr>
+        <p:style>
+          <a:lnRef idx="2">
+            <a:schemeClr val="accent1">
+              <a:shade val="50000"/>
+            </a:schemeClr>
+          </a:lnRef>
+          <a:fillRef idx="1">
+            <a:schemeClr val="accent1"/>
+          </a:fillRef>
+          <a:effectRef idx="0">
+            <a:schemeClr val="accent1"/>
+          </a:effectRef>
+          <a:fontRef idx="minor">
+            <a:schemeClr val="lt1"/>
+          </a:fontRef>
+        </p:style>
+        <p:txBody>
+          <a:bodyPr rtlCol="0" anchor="ctr"/>
+          <a:lstStyle/>
+          <a:p>
+            <a:pPr algn="ctr"/>
+            <a:endParaRPr lang="en-US" dirty="0"/>
+          </a:p>
+        </p:txBody>
+      </p:sp>
+      <p:sp>
+        <p:nvSpPr>
+          <p:cNvPr id="52" name="Oval 51">
+            <a:extLst>
+              <a:ext uri="{FF2B5EF4-FFF2-40B4-BE49-F238E27FC236}">
+                <a16:creationId xmlns:a16="http://schemas.microsoft.com/office/drawing/2014/main" id="{9253DFA3-9652-C44F-B9EF-EB26376FF6A1}"/>
+              </a:ext>
+            </a:extLst>
+          </p:cNvPr>
+          <p:cNvSpPr/>
+          <p:nvPr/>
+        </p:nvSpPr>
+        <p:spPr>
+          <a:xfrm>
+            <a:off x="3531753" y="5409332"/>
+            <a:ext cx="125434" cy="109123"/>
+          </a:xfrm>
+          <a:prstGeom prst="ellipse">
+            <a:avLst/>
+          </a:prstGeom>
+          <a:solidFill>
+            <a:schemeClr val="bg1"/>
+          </a:solidFill>
+          <a:ln w="19050">
+            <a:solidFill>
+              <a:srgbClr val="0432FF"/>
+            </a:solidFill>
+          </a:ln>
+        </p:spPr>
+        <p:style>
+          <a:lnRef idx="2">
+            <a:schemeClr val="accent1">
+              <a:shade val="50000"/>
+            </a:schemeClr>
+          </a:lnRef>
+          <a:fillRef idx="1">
+            <a:schemeClr val="accent1"/>
+          </a:fillRef>
+          <a:effectRef idx="0">
+            <a:schemeClr val="accent1"/>
+          </a:effectRef>
+          <a:fontRef idx="minor">
+            <a:schemeClr val="lt1"/>
+          </a:fontRef>
+        </p:style>
+        <p:txBody>
+          <a:bodyPr rtlCol="0" anchor="ctr"/>
+          <a:lstStyle/>
+          <a:p>
+            <a:pPr algn="ctr"/>
+            <a:endParaRPr lang="en-US" dirty="0"/>
+          </a:p>
+        </p:txBody>
+      </p:sp>
+      <p:sp>
+        <p:nvSpPr>
+          <p:cNvPr id="53" name="Oval 52">
+            <a:extLst>
+              <a:ext uri="{FF2B5EF4-FFF2-40B4-BE49-F238E27FC236}">
+                <a16:creationId xmlns:a16="http://schemas.microsoft.com/office/drawing/2014/main" id="{951308D9-AA93-FB4F-A9EF-F7E94655B7BF}"/>
+              </a:ext>
+            </a:extLst>
+          </p:cNvPr>
+          <p:cNvSpPr/>
+          <p:nvPr/>
+        </p:nvSpPr>
+        <p:spPr>
+          <a:xfrm>
+            <a:off x="11105384" y="6047290"/>
+            <a:ext cx="125434" cy="109123"/>
+          </a:xfrm>
+          <a:prstGeom prst="ellipse">
+            <a:avLst/>
+          </a:prstGeom>
+          <a:solidFill>
+            <a:schemeClr val="bg1"/>
+          </a:solidFill>
+          <a:ln w="19050">
+            <a:solidFill>
+              <a:srgbClr val="0432FF"/>
+            </a:solidFill>
+          </a:ln>
+        </p:spPr>
+        <p:style>
+          <a:lnRef idx="2">
+            <a:schemeClr val="accent1">
+              <a:shade val="50000"/>
+            </a:schemeClr>
+          </a:lnRef>
+          <a:fillRef idx="1">
+            <a:schemeClr val="accent1"/>
+          </a:fillRef>
+          <a:effectRef idx="0">
+            <a:schemeClr val="accent1"/>
+          </a:effectRef>
+          <a:fontRef idx="minor">
+            <a:schemeClr val="lt1"/>
+          </a:fontRef>
+        </p:style>
+        <p:txBody>
+          <a:bodyPr rtlCol="0" anchor="ctr"/>
+          <a:lstStyle/>
+          <a:p>
+            <a:pPr algn="ctr"/>
+            <a:endParaRPr lang="en-US" dirty="0"/>
+          </a:p>
+        </p:txBody>
+      </p:sp>
+      <p:sp>
+        <p:nvSpPr>
+          <p:cNvPr id="54" name="Oval 53">
+            <a:extLst>
+              <a:ext uri="{FF2B5EF4-FFF2-40B4-BE49-F238E27FC236}">
+                <a16:creationId xmlns:a16="http://schemas.microsoft.com/office/drawing/2014/main" id="{502B9E1C-36CC-DA4D-A940-C39BF90D54F6}"/>
+              </a:ext>
+            </a:extLst>
+          </p:cNvPr>
+          <p:cNvSpPr/>
+          <p:nvPr/>
+        </p:nvSpPr>
+        <p:spPr>
+          <a:xfrm>
+            <a:off x="10583934" y="5921031"/>
+            <a:ext cx="125434" cy="109123"/>
+          </a:xfrm>
+          <a:prstGeom prst="ellipse">
+            <a:avLst/>
+          </a:prstGeom>
+          <a:solidFill>
+            <a:schemeClr val="bg1"/>
+          </a:solidFill>
+          <a:ln w="19050">
+            <a:solidFill>
+              <a:srgbClr val="0432FF"/>
+            </a:solidFill>
+          </a:ln>
+        </p:spPr>
+        <p:style>
+          <a:lnRef idx="2">
+            <a:schemeClr val="accent1">
+              <a:shade val="50000"/>
+            </a:schemeClr>
+          </a:lnRef>
+          <a:fillRef idx="1">
+            <a:schemeClr val="accent1"/>
+          </a:fillRef>
+          <a:effectRef idx="0">
+            <a:schemeClr val="accent1"/>
+          </a:effectRef>
+          <a:fontRef idx="minor">
+            <a:schemeClr val="lt1"/>
+          </a:fontRef>
+        </p:style>
+        <p:txBody>
+          <a:bodyPr rtlCol="0" anchor="ctr"/>
+          <a:lstStyle/>
+          <a:p>
+            <a:pPr algn="ctr"/>
+            <a:endParaRPr lang="en-US" dirty="0"/>
+          </a:p>
+        </p:txBody>
+      </p:sp>
+      <p:sp>
+        <p:nvSpPr>
+          <p:cNvPr id="55" name="Oval 54">
+            <a:extLst>
+              <a:ext uri="{FF2B5EF4-FFF2-40B4-BE49-F238E27FC236}">
+                <a16:creationId xmlns:a16="http://schemas.microsoft.com/office/drawing/2014/main" id="{3E8968A9-092A-0540-A283-BDF1938D0FE8}"/>
+              </a:ext>
+            </a:extLst>
+          </p:cNvPr>
+          <p:cNvSpPr/>
+          <p:nvPr/>
+        </p:nvSpPr>
+        <p:spPr>
+          <a:xfrm>
+            <a:off x="8441492" y="4216068"/>
+            <a:ext cx="125434" cy="109123"/>
+          </a:xfrm>
+          <a:prstGeom prst="ellipse">
+            <a:avLst/>
+          </a:prstGeom>
+          <a:solidFill>
+            <a:schemeClr val="bg1"/>
+          </a:solidFill>
+          <a:ln w="19050">
+            <a:solidFill>
+              <a:srgbClr val="0432FF"/>
+            </a:solidFill>
+          </a:ln>
+        </p:spPr>
+        <p:style>
+          <a:lnRef idx="2">
+            <a:schemeClr val="accent1">
+              <a:shade val="50000"/>
+            </a:schemeClr>
+          </a:lnRef>
+          <a:fillRef idx="1">
+            <a:schemeClr val="accent1"/>
+          </a:fillRef>
+          <a:effectRef idx="0">
+            <a:schemeClr val="accent1"/>
+          </a:effectRef>
+          <a:fontRef idx="minor">
+            <a:schemeClr val="lt1"/>
+          </a:fontRef>
+        </p:style>
+        <p:txBody>
+          <a:bodyPr rtlCol="0" anchor="ctr"/>
+          <a:lstStyle/>
+          <a:p>
+            <a:pPr algn="ctr"/>
+            <a:endParaRPr lang="en-US" dirty="0"/>
+          </a:p>
+        </p:txBody>
+      </p:sp>
+      <p:sp>
+        <p:nvSpPr>
+          <p:cNvPr id="58" name="Oval 57">
+            <a:extLst>
+              <a:ext uri="{FF2B5EF4-FFF2-40B4-BE49-F238E27FC236}">
+                <a16:creationId xmlns:a16="http://schemas.microsoft.com/office/drawing/2014/main" id="{F619C4C4-D9C1-6A46-ACC0-47D1DA74334C}"/>
+              </a:ext>
+            </a:extLst>
+          </p:cNvPr>
+          <p:cNvSpPr/>
+          <p:nvPr/>
+        </p:nvSpPr>
+        <p:spPr>
+          <a:xfrm>
+            <a:off x="8968415" y="4535560"/>
+            <a:ext cx="125434" cy="109123"/>
+          </a:xfrm>
+          <a:prstGeom prst="ellipse">
+            <a:avLst/>
+          </a:prstGeom>
+          <a:solidFill>
+            <a:schemeClr val="bg1"/>
+          </a:solidFill>
+          <a:ln w="19050">
+            <a:solidFill>
+              <a:srgbClr val="0432FF"/>
+            </a:solidFill>
+          </a:ln>
+        </p:spPr>
+        <p:style>
+          <a:lnRef idx="2">
+            <a:schemeClr val="accent1">
+              <a:shade val="50000"/>
+            </a:schemeClr>
+          </a:lnRef>
+          <a:fillRef idx="1">
+            <a:schemeClr val="accent1"/>
+          </a:fillRef>
+          <a:effectRef idx="0">
+            <a:schemeClr val="accent1"/>
+          </a:effectRef>
+          <a:fontRef idx="minor">
+            <a:schemeClr val="lt1"/>
+          </a:fontRef>
+        </p:style>
+        <p:txBody>
+          <a:bodyPr rtlCol="0" anchor="ctr"/>
+          <a:lstStyle/>
+          <a:p>
+            <a:pPr algn="ctr"/>
+            <a:endParaRPr lang="en-US" dirty="0"/>
+          </a:p>
+        </p:txBody>
+      </p:sp>
+      <p:sp>
+        <p:nvSpPr>
+          <p:cNvPr id="60" name="Oval 59">
+            <a:extLst>
+              <a:ext uri="{FF2B5EF4-FFF2-40B4-BE49-F238E27FC236}">
+                <a16:creationId xmlns:a16="http://schemas.microsoft.com/office/drawing/2014/main" id="{01641642-7144-E341-968F-22652FBCFDD1}"/>
+              </a:ext>
+            </a:extLst>
+          </p:cNvPr>
+          <p:cNvSpPr/>
+          <p:nvPr/>
+        </p:nvSpPr>
+        <p:spPr>
+          <a:xfrm>
+            <a:off x="2306913" y="5665086"/>
+            <a:ext cx="125434" cy="109123"/>
+          </a:xfrm>
+          <a:prstGeom prst="ellipse">
+            <a:avLst/>
+          </a:prstGeom>
+          <a:solidFill>
+            <a:schemeClr val="bg1"/>
+          </a:solidFill>
+          <a:ln w="19050">
+            <a:solidFill>
+              <a:srgbClr val="0432FF"/>
+            </a:solidFill>
+          </a:ln>
+        </p:spPr>
+        <p:style>
+          <a:lnRef idx="2">
+            <a:schemeClr val="accent1">
+              <a:shade val="50000"/>
+            </a:schemeClr>
+          </a:lnRef>
+          <a:fillRef idx="1">
+            <a:schemeClr val="accent1"/>
+          </a:fillRef>
+          <a:effectRef idx="0">
+            <a:schemeClr val="accent1"/>
+          </a:effectRef>
+          <a:fontRef idx="minor">
+            <a:schemeClr val="lt1"/>
+          </a:fontRef>
+        </p:style>
+        <p:txBody>
+          <a:bodyPr rtlCol="0" anchor="ctr"/>
+          <a:lstStyle/>
+          <a:p>
+            <a:pPr algn="ctr"/>
+            <a:endParaRPr lang="en-US" dirty="0"/>
+          </a:p>
+        </p:txBody>
+      </p:sp>
+      <p:sp>
+        <p:nvSpPr>
+          <p:cNvPr id="61" name="Oval 60">
+            <a:extLst>
+              <a:ext uri="{FF2B5EF4-FFF2-40B4-BE49-F238E27FC236}">
+                <a16:creationId xmlns:a16="http://schemas.microsoft.com/office/drawing/2014/main" id="{77960EBF-E30B-C142-93D9-E972EE24D457}"/>
+              </a:ext>
+            </a:extLst>
+          </p:cNvPr>
+          <p:cNvSpPr/>
+          <p:nvPr/>
+        </p:nvSpPr>
+        <p:spPr>
+          <a:xfrm>
+            <a:off x="4717861" y="910104"/>
+            <a:ext cx="125434" cy="109123"/>
+          </a:xfrm>
+          <a:prstGeom prst="ellipse">
+            <a:avLst/>
+          </a:prstGeom>
+          <a:solidFill>
+            <a:schemeClr val="bg1"/>
+          </a:solidFill>
+          <a:ln w="19050">
+            <a:solidFill>
+              <a:srgbClr val="0432FF"/>
+            </a:solidFill>
+          </a:ln>
+        </p:spPr>
+        <p:style>
+          <a:lnRef idx="2">
+            <a:schemeClr val="accent1">
+              <a:shade val="50000"/>
+            </a:schemeClr>
+          </a:lnRef>
+          <a:fillRef idx="1">
+            <a:schemeClr val="accent1"/>
+          </a:fillRef>
+          <a:effectRef idx="0">
+            <a:schemeClr val="accent1"/>
+          </a:effectRef>
+          <a:fontRef idx="minor">
+            <a:schemeClr val="lt1"/>
+          </a:fontRef>
+        </p:style>
+        <p:txBody>
+          <a:bodyPr rtlCol="0" anchor="ctr"/>
+          <a:lstStyle/>
+          <a:p>
+            <a:pPr algn="ctr"/>
+            <a:endParaRPr lang="en-US" dirty="0"/>
+          </a:p>
+        </p:txBody>
+      </p:sp>
+      <p:cxnSp>
+        <p:nvCxnSpPr>
+          <p:cNvPr id="20" name="Elbow Connector 19">
+            <a:extLst>
+              <a:ext uri="{FF2B5EF4-FFF2-40B4-BE49-F238E27FC236}">
+                <a16:creationId xmlns:a16="http://schemas.microsoft.com/office/drawing/2014/main" id="{AD14E751-9525-EC48-9C74-3F7C5B16063B}"/>
+              </a:ext>
+            </a:extLst>
+          </p:cNvPr>
+          <p:cNvCxnSpPr>
+            <a:cxnSpLocks/>
+          </p:cNvCxnSpPr>
+          <p:nvPr/>
+        </p:nvCxnSpPr>
+        <p:spPr>
+          <a:xfrm rot="10800000" flipV="1">
+            <a:off x="3247474" y="5643131"/>
+            <a:ext cx="695088" cy="787485"/>
+          </a:xfrm>
+          <a:prstGeom prst="bentConnector3">
+            <a:avLst/>
+          </a:prstGeom>
+          <a:ln w="38100">
+            <a:solidFill>
+              <a:srgbClr val="FF0000"/>
+            </a:solidFill>
+          </a:ln>
+        </p:spPr>
+        <p:style>
+          <a:lnRef idx="1">
+            <a:schemeClr val="accent1"/>
+          </a:lnRef>
+          <a:fillRef idx="0">
+            <a:schemeClr val="accent1"/>
+          </a:fillRef>
+          <a:effectRef idx="0">
+            <a:schemeClr val="accent1"/>
+          </a:effectRef>
+          <a:fontRef idx="minor">
+            <a:schemeClr val="tx1"/>
+          </a:fontRef>
+        </p:style>
+      </p:cxnSp>
+      <p:sp>
+        <p:nvSpPr>
+          <p:cNvPr id="59" name="Oval 58">
+            <a:extLst>
+              <a:ext uri="{FF2B5EF4-FFF2-40B4-BE49-F238E27FC236}">
+                <a16:creationId xmlns:a16="http://schemas.microsoft.com/office/drawing/2014/main" id="{4C165145-FC86-A145-9A19-46E5122C457B}"/>
+              </a:ext>
+            </a:extLst>
+          </p:cNvPr>
+          <p:cNvSpPr/>
+          <p:nvPr/>
+        </p:nvSpPr>
+        <p:spPr>
+          <a:xfrm>
+            <a:off x="3136736" y="6376055"/>
+            <a:ext cx="125434" cy="109123"/>
+          </a:xfrm>
+          <a:prstGeom prst="ellipse">
+            <a:avLst/>
+          </a:prstGeom>
+          <a:solidFill>
+            <a:schemeClr val="bg1"/>
+          </a:solidFill>
+          <a:ln w="19050">
+            <a:solidFill>
+              <a:srgbClr val="0432FF"/>
+            </a:solidFill>
+          </a:ln>
+        </p:spPr>
+        <p:style>
+          <a:lnRef idx="2">
+            <a:schemeClr val="accent1">
+              <a:shade val="50000"/>
+            </a:schemeClr>
+          </a:lnRef>
+          <a:fillRef idx="1">
+            <a:schemeClr val="accent1"/>
+          </a:fillRef>
+          <a:effectRef idx="0">
+            <a:schemeClr val="accent1"/>
+          </a:effectRef>
+          <a:fontRef idx="minor">
+            <a:schemeClr val="lt1"/>
+          </a:fontRef>
+        </p:style>
+        <p:txBody>
+          <a:bodyPr rtlCol="0" anchor="ctr"/>
+          <a:lstStyle/>
+          <a:p>
+            <a:pPr algn="ctr"/>
+            <a:endParaRPr lang="en-US" dirty="0"/>
+          </a:p>
+        </p:txBody>
+      </p:sp>
+      <p:cxnSp>
+        <p:nvCxnSpPr>
+          <p:cNvPr id="38" name="Straight Connector 37">
+            <a:extLst>
+              <a:ext uri="{FF2B5EF4-FFF2-40B4-BE49-F238E27FC236}">
+                <a16:creationId xmlns:a16="http://schemas.microsoft.com/office/drawing/2014/main" id="{36221210-AD57-6E4C-BDC6-3DB581A9ADCD}"/>
+              </a:ext>
+            </a:extLst>
+          </p:cNvPr>
+          <p:cNvCxnSpPr>
+            <a:cxnSpLocks/>
+            <a:stCxn id="203" idx="1"/>
+            <a:endCxn id="25" idx="0"/>
+          </p:cNvCxnSpPr>
+          <p:nvPr/>
+        </p:nvCxnSpPr>
+        <p:spPr>
+          <a:xfrm flipH="1">
+            <a:off x="7942615" y="4003410"/>
+            <a:ext cx="2937" cy="533171"/>
+          </a:xfrm>
+          <a:prstGeom prst="line">
+            <a:avLst/>
+          </a:prstGeom>
+          <a:ln w="28575">
+            <a:solidFill>
+              <a:schemeClr val="tx1"/>
+            </a:solidFill>
+          </a:ln>
+        </p:spPr>
+        <p:style>
+          <a:lnRef idx="1">
+            <a:schemeClr val="accent1"/>
+          </a:lnRef>
+          <a:fillRef idx="0">
+            <a:schemeClr val="accent1"/>
+          </a:fillRef>
+          <a:effectRef idx="0">
+            <a:schemeClr val="accent1"/>
+          </a:effectRef>
+          <a:fontRef idx="minor">
+            <a:schemeClr val="tx1"/>
+          </a:fontRef>
+        </p:style>
+      </p:cxnSp>
+      <p:sp>
+        <p:nvSpPr>
+          <p:cNvPr id="56" name="Oval 55">
+            <a:extLst>
+              <a:ext uri="{FF2B5EF4-FFF2-40B4-BE49-F238E27FC236}">
+                <a16:creationId xmlns:a16="http://schemas.microsoft.com/office/drawing/2014/main" id="{BB65258C-2B3C-2E49-9611-33494A900EFB}"/>
+              </a:ext>
+            </a:extLst>
+          </p:cNvPr>
+          <p:cNvSpPr/>
+          <p:nvPr/>
+        </p:nvSpPr>
+        <p:spPr>
+          <a:xfrm>
+            <a:off x="7873058" y="4474797"/>
+            <a:ext cx="125434" cy="109123"/>
+          </a:xfrm>
+          <a:prstGeom prst="ellipse">
+            <a:avLst/>
+          </a:prstGeom>
+          <a:solidFill>
+            <a:schemeClr val="bg1"/>
+          </a:solidFill>
+          <a:ln w="19050">
+            <a:solidFill>
+              <a:srgbClr val="0432FF"/>
+            </a:solidFill>
+          </a:ln>
+        </p:spPr>
+        <p:style>
+          <a:lnRef idx="2">
+            <a:schemeClr val="accent1">
+              <a:shade val="50000"/>
+            </a:schemeClr>
+          </a:lnRef>
+          <a:fillRef idx="1">
+            <a:schemeClr val="accent1"/>
+          </a:fillRef>
+          <a:effectRef idx="0">
+            <a:schemeClr val="accent1"/>
+          </a:effectRef>
+          <a:fontRef idx="minor">
+            <a:schemeClr val="lt1"/>
+          </a:fontRef>
+        </p:style>
+        <p:txBody>
+          <a:bodyPr rtlCol="0" anchor="ctr"/>
+          <a:lstStyle/>
+          <a:p>
+            <a:pPr algn="ctr"/>
+            <a:endParaRPr lang="en-US" dirty="0"/>
+          </a:p>
+        </p:txBody>
+      </p:sp>
+      <p:sp>
+        <p:nvSpPr>
+          <p:cNvPr id="46" name="Multiply 45">
+            <a:extLst>
+              <a:ext uri="{FF2B5EF4-FFF2-40B4-BE49-F238E27FC236}">
+                <a16:creationId xmlns:a16="http://schemas.microsoft.com/office/drawing/2014/main" id="{E29F4C27-7C1F-4640-B72D-612A66D8AA02}"/>
+              </a:ext>
+            </a:extLst>
+          </p:cNvPr>
+          <p:cNvSpPr/>
+          <p:nvPr/>
+        </p:nvSpPr>
+        <p:spPr>
+          <a:xfrm>
+            <a:off x="8433526" y="4203263"/>
+            <a:ext cx="138373" cy="136532"/>
+          </a:xfrm>
+          <a:prstGeom prst="mathMultiply">
+            <a:avLst>
+              <a:gd name="adj1" fmla="val 7109"/>
+            </a:avLst>
+          </a:prstGeom>
+          <a:ln w="9525">
+            <a:solidFill>
+              <a:srgbClr val="FF0000"/>
+            </a:solidFill>
+          </a:ln>
+        </p:spPr>
+        <p:style>
+          <a:lnRef idx="2">
+            <a:schemeClr val="accent1">
+              <a:shade val="50000"/>
+            </a:schemeClr>
+          </a:lnRef>
+          <a:fillRef idx="1">
+            <a:schemeClr val="accent1"/>
+          </a:fillRef>
+          <a:effectRef idx="0">
+            <a:schemeClr val="accent1"/>
+          </a:effectRef>
+          <a:fontRef idx="minor">
+            <a:schemeClr val="lt1"/>
+          </a:fontRef>
+        </p:style>
+        <p:txBody>
+          <a:bodyPr rtlCol="0" anchor="ctr"/>
+          <a:lstStyle/>
+          <a:p>
+            <a:pPr algn="ctr"/>
+            <a:endParaRPr lang="en-US" dirty="0"/>
           </a:p>
         </p:txBody>
       </p:sp>

</xml_diff>

<commit_message>
Added setup prprocedures document, experiments and results section, and python calculations section
</commit_message>
<xml_diff>
--- a/HRS Setup.pptx
+++ b/HRS Setup.pptx
@@ -6,6 +6,7 @@
   </p:sldMasterIdLst>
   <p:sldIdLst>
     <p:sldId id="257" r:id="rId2"/>
+    <p:sldId id="258" r:id="rId3"/>
   </p:sldIdLst>
   <p:sldSz cx="12192000" cy="6858000"/>
   <p:notesSz cx="6858000" cy="9144000"/>
@@ -241,7 +242,7 @@
           <a:p>
             <a:fld id="{07B49D9B-B35E-094A-87A6-0FB71602174F}" type="datetimeFigureOut">
               <a:rPr lang="en-US" smtClean="0"/>
-              <a:t>6/25/18</a:t>
+              <a:t>6/28/18</a:t>
             </a:fld>
             <a:endParaRPr lang="en-US"/>
           </a:p>
@@ -409,7 +410,7 @@
           <a:p>
             <a:fld id="{07B49D9B-B35E-094A-87A6-0FB71602174F}" type="datetimeFigureOut">
               <a:rPr lang="en-US" smtClean="0"/>
-              <a:t>6/25/18</a:t>
+              <a:t>6/28/18</a:t>
             </a:fld>
             <a:endParaRPr lang="en-US"/>
           </a:p>
@@ -587,7 +588,7 @@
           <a:p>
             <a:fld id="{07B49D9B-B35E-094A-87A6-0FB71602174F}" type="datetimeFigureOut">
               <a:rPr lang="en-US" smtClean="0"/>
-              <a:t>6/25/18</a:t>
+              <a:t>6/28/18</a:t>
             </a:fld>
             <a:endParaRPr lang="en-US"/>
           </a:p>
@@ -755,7 +756,7 @@
           <a:p>
             <a:fld id="{07B49D9B-B35E-094A-87A6-0FB71602174F}" type="datetimeFigureOut">
               <a:rPr lang="en-US" smtClean="0"/>
-              <a:t>6/25/18</a:t>
+              <a:t>6/28/18</a:t>
             </a:fld>
             <a:endParaRPr lang="en-US"/>
           </a:p>
@@ -1000,7 +1001,7 @@
           <a:p>
             <a:fld id="{07B49D9B-B35E-094A-87A6-0FB71602174F}" type="datetimeFigureOut">
               <a:rPr lang="en-US" smtClean="0"/>
-              <a:t>6/25/18</a:t>
+              <a:t>6/28/18</a:t>
             </a:fld>
             <a:endParaRPr lang="en-US"/>
           </a:p>
@@ -1229,7 +1230,7 @@
           <a:p>
             <a:fld id="{07B49D9B-B35E-094A-87A6-0FB71602174F}" type="datetimeFigureOut">
               <a:rPr lang="en-US" smtClean="0"/>
-              <a:t>6/25/18</a:t>
+              <a:t>6/28/18</a:t>
             </a:fld>
             <a:endParaRPr lang="en-US"/>
           </a:p>
@@ -1593,7 +1594,7 @@
           <a:p>
             <a:fld id="{07B49D9B-B35E-094A-87A6-0FB71602174F}" type="datetimeFigureOut">
               <a:rPr lang="en-US" smtClean="0"/>
-              <a:t>6/25/18</a:t>
+              <a:t>6/28/18</a:t>
             </a:fld>
             <a:endParaRPr lang="en-US"/>
           </a:p>
@@ -1710,7 +1711,7 @@
           <a:p>
             <a:fld id="{07B49D9B-B35E-094A-87A6-0FB71602174F}" type="datetimeFigureOut">
               <a:rPr lang="en-US" smtClean="0"/>
-              <a:t>6/25/18</a:t>
+              <a:t>6/28/18</a:t>
             </a:fld>
             <a:endParaRPr lang="en-US"/>
           </a:p>
@@ -1805,7 +1806,7 @@
           <a:p>
             <a:fld id="{07B49D9B-B35E-094A-87A6-0FB71602174F}" type="datetimeFigureOut">
               <a:rPr lang="en-US" smtClean="0"/>
-              <a:t>6/25/18</a:t>
+              <a:t>6/28/18</a:t>
             </a:fld>
             <a:endParaRPr lang="en-US"/>
           </a:p>
@@ -2080,7 +2081,7 @@
           <a:p>
             <a:fld id="{07B49D9B-B35E-094A-87A6-0FB71602174F}" type="datetimeFigureOut">
               <a:rPr lang="en-US" smtClean="0"/>
-              <a:t>6/25/18</a:t>
+              <a:t>6/28/18</a:t>
             </a:fld>
             <a:endParaRPr lang="en-US"/>
           </a:p>
@@ -2332,7 +2333,7 @@
           <a:p>
             <a:fld id="{07B49D9B-B35E-094A-87A6-0FB71602174F}" type="datetimeFigureOut">
               <a:rPr lang="en-US" smtClean="0"/>
-              <a:t>6/25/18</a:t>
+              <a:t>6/28/18</a:t>
             </a:fld>
             <a:endParaRPr lang="en-US"/>
           </a:p>
@@ -2543,7 +2544,7 @@
           <a:p>
             <a:fld id="{07B49D9B-B35E-094A-87A6-0FB71602174F}" type="datetimeFigureOut">
               <a:rPr lang="en-US" smtClean="0"/>
-              <a:t>6/25/18</a:t>
+              <a:t>6/28/18</a:t>
             </a:fld>
             <a:endParaRPr lang="en-US"/>
           </a:p>
@@ -7980,7 +7981,7 @@
           <p:cNvPr id="3" name="Oval 2">
             <a:extLst>
               <a:ext uri="{FF2B5EF4-FFF2-40B4-BE49-F238E27FC236}">
-                <a16:creationId xmlns:a16="http://schemas.microsoft.com/office/drawing/2014/main" id="{AA7A4266-2074-7147-9456-8E60474EB96C}"/>
+                <a16:creationId xmlns:a16="http://schemas.microsoft.com/office/drawing/2014/main" xmlns="" id="{AA7A4266-2074-7147-9456-8E60474EB96C}"/>
               </a:ext>
             </a:extLst>
           </p:cNvPr>
@@ -8034,7 +8035,7 @@
           <p:cNvPr id="48" name="Oval 47">
             <a:extLst>
               <a:ext uri="{FF2B5EF4-FFF2-40B4-BE49-F238E27FC236}">
-                <a16:creationId xmlns:a16="http://schemas.microsoft.com/office/drawing/2014/main" id="{493FC27E-DB73-3A4D-9305-DE08DF2F2260}"/>
+                <a16:creationId xmlns:a16="http://schemas.microsoft.com/office/drawing/2014/main" xmlns="" id="{493FC27E-DB73-3A4D-9305-DE08DF2F2260}"/>
               </a:ext>
             </a:extLst>
           </p:cNvPr>
@@ -8088,7 +8089,7 @@
           <p:cNvPr id="49" name="Oval 48">
             <a:extLst>
               <a:ext uri="{FF2B5EF4-FFF2-40B4-BE49-F238E27FC236}">
-                <a16:creationId xmlns:a16="http://schemas.microsoft.com/office/drawing/2014/main" id="{9AD8515F-0B48-8642-874E-B716EA0E6F34}"/>
+                <a16:creationId xmlns:a16="http://schemas.microsoft.com/office/drawing/2014/main" xmlns="" id="{9AD8515F-0B48-8642-874E-B716EA0E6F34}"/>
               </a:ext>
             </a:extLst>
           </p:cNvPr>
@@ -8142,7 +8143,7 @@
           <p:cNvPr id="51" name="Oval 50">
             <a:extLst>
               <a:ext uri="{FF2B5EF4-FFF2-40B4-BE49-F238E27FC236}">
-                <a16:creationId xmlns:a16="http://schemas.microsoft.com/office/drawing/2014/main" id="{3962512C-43BA-7647-8A05-FAD45E718949}"/>
+                <a16:creationId xmlns:a16="http://schemas.microsoft.com/office/drawing/2014/main" xmlns="" id="{3962512C-43BA-7647-8A05-FAD45E718949}"/>
               </a:ext>
             </a:extLst>
           </p:cNvPr>
@@ -8196,7 +8197,7 @@
           <p:cNvPr id="52" name="Oval 51">
             <a:extLst>
               <a:ext uri="{FF2B5EF4-FFF2-40B4-BE49-F238E27FC236}">
-                <a16:creationId xmlns:a16="http://schemas.microsoft.com/office/drawing/2014/main" id="{9253DFA3-9652-C44F-B9EF-EB26376FF6A1}"/>
+                <a16:creationId xmlns:a16="http://schemas.microsoft.com/office/drawing/2014/main" xmlns="" id="{9253DFA3-9652-C44F-B9EF-EB26376FF6A1}"/>
               </a:ext>
             </a:extLst>
           </p:cNvPr>
@@ -8250,7 +8251,7 @@
           <p:cNvPr id="53" name="Oval 52">
             <a:extLst>
               <a:ext uri="{FF2B5EF4-FFF2-40B4-BE49-F238E27FC236}">
-                <a16:creationId xmlns:a16="http://schemas.microsoft.com/office/drawing/2014/main" id="{951308D9-AA93-FB4F-A9EF-F7E94655B7BF}"/>
+                <a16:creationId xmlns:a16="http://schemas.microsoft.com/office/drawing/2014/main" xmlns="" id="{951308D9-AA93-FB4F-A9EF-F7E94655B7BF}"/>
               </a:ext>
             </a:extLst>
           </p:cNvPr>
@@ -8304,7 +8305,7 @@
           <p:cNvPr id="54" name="Oval 53">
             <a:extLst>
               <a:ext uri="{FF2B5EF4-FFF2-40B4-BE49-F238E27FC236}">
-                <a16:creationId xmlns:a16="http://schemas.microsoft.com/office/drawing/2014/main" id="{502B9E1C-36CC-DA4D-A940-C39BF90D54F6}"/>
+                <a16:creationId xmlns:a16="http://schemas.microsoft.com/office/drawing/2014/main" xmlns="" id="{502B9E1C-36CC-DA4D-A940-C39BF90D54F6}"/>
               </a:ext>
             </a:extLst>
           </p:cNvPr>
@@ -8358,7 +8359,7 @@
           <p:cNvPr id="55" name="Oval 54">
             <a:extLst>
               <a:ext uri="{FF2B5EF4-FFF2-40B4-BE49-F238E27FC236}">
-                <a16:creationId xmlns:a16="http://schemas.microsoft.com/office/drawing/2014/main" id="{3E8968A9-092A-0540-A283-BDF1938D0FE8}"/>
+                <a16:creationId xmlns:a16="http://schemas.microsoft.com/office/drawing/2014/main" xmlns="" id="{3E8968A9-092A-0540-A283-BDF1938D0FE8}"/>
               </a:ext>
             </a:extLst>
           </p:cNvPr>
@@ -8412,7 +8413,7 @@
           <p:cNvPr id="58" name="Oval 57">
             <a:extLst>
               <a:ext uri="{FF2B5EF4-FFF2-40B4-BE49-F238E27FC236}">
-                <a16:creationId xmlns:a16="http://schemas.microsoft.com/office/drawing/2014/main" id="{F619C4C4-D9C1-6A46-ACC0-47D1DA74334C}"/>
+                <a16:creationId xmlns:a16="http://schemas.microsoft.com/office/drawing/2014/main" xmlns="" id="{F619C4C4-D9C1-6A46-ACC0-47D1DA74334C}"/>
               </a:ext>
             </a:extLst>
           </p:cNvPr>
@@ -8466,7 +8467,7 @@
           <p:cNvPr id="60" name="Oval 59">
             <a:extLst>
               <a:ext uri="{FF2B5EF4-FFF2-40B4-BE49-F238E27FC236}">
-                <a16:creationId xmlns:a16="http://schemas.microsoft.com/office/drawing/2014/main" id="{01641642-7144-E341-968F-22652FBCFDD1}"/>
+                <a16:creationId xmlns:a16="http://schemas.microsoft.com/office/drawing/2014/main" xmlns="" id="{01641642-7144-E341-968F-22652FBCFDD1}"/>
               </a:ext>
             </a:extLst>
           </p:cNvPr>
@@ -8520,7 +8521,7 @@
           <p:cNvPr id="61" name="Oval 60">
             <a:extLst>
               <a:ext uri="{FF2B5EF4-FFF2-40B4-BE49-F238E27FC236}">
-                <a16:creationId xmlns:a16="http://schemas.microsoft.com/office/drawing/2014/main" id="{77960EBF-E30B-C142-93D9-E972EE24D457}"/>
+                <a16:creationId xmlns:a16="http://schemas.microsoft.com/office/drawing/2014/main" xmlns="" id="{77960EBF-E30B-C142-93D9-E972EE24D457}"/>
               </a:ext>
             </a:extLst>
           </p:cNvPr>
@@ -8574,7 +8575,7 @@
           <p:cNvPr id="20" name="Elbow Connector 19">
             <a:extLst>
               <a:ext uri="{FF2B5EF4-FFF2-40B4-BE49-F238E27FC236}">
-                <a16:creationId xmlns:a16="http://schemas.microsoft.com/office/drawing/2014/main" id="{AD14E751-9525-EC48-9C74-3F7C5B16063B}"/>
+                <a16:creationId xmlns:a16="http://schemas.microsoft.com/office/drawing/2014/main" xmlns="" id="{AD14E751-9525-EC48-9C74-3F7C5B16063B}"/>
               </a:ext>
             </a:extLst>
           </p:cNvPr>
@@ -8617,7 +8618,7 @@
           <p:cNvPr id="59" name="Oval 58">
             <a:extLst>
               <a:ext uri="{FF2B5EF4-FFF2-40B4-BE49-F238E27FC236}">
-                <a16:creationId xmlns:a16="http://schemas.microsoft.com/office/drawing/2014/main" id="{4C165145-FC86-A145-9A19-46E5122C457B}"/>
+                <a16:creationId xmlns:a16="http://schemas.microsoft.com/office/drawing/2014/main" xmlns="" id="{4C165145-FC86-A145-9A19-46E5122C457B}"/>
               </a:ext>
             </a:extLst>
           </p:cNvPr>
@@ -8671,7 +8672,7 @@
           <p:cNvPr id="38" name="Straight Connector 37">
             <a:extLst>
               <a:ext uri="{FF2B5EF4-FFF2-40B4-BE49-F238E27FC236}">
-                <a16:creationId xmlns:a16="http://schemas.microsoft.com/office/drawing/2014/main" id="{36221210-AD57-6E4C-BDC6-3DB581A9ADCD}"/>
+                <a16:creationId xmlns:a16="http://schemas.microsoft.com/office/drawing/2014/main" xmlns="" id="{36221210-AD57-6E4C-BDC6-3DB581A9ADCD}"/>
               </a:ext>
             </a:extLst>
           </p:cNvPr>
@@ -8716,7 +8717,7 @@
           <p:cNvPr id="56" name="Oval 55">
             <a:extLst>
               <a:ext uri="{FF2B5EF4-FFF2-40B4-BE49-F238E27FC236}">
-                <a16:creationId xmlns:a16="http://schemas.microsoft.com/office/drawing/2014/main" id="{BB65258C-2B3C-2E49-9611-33494A900EFB}"/>
+                <a16:creationId xmlns:a16="http://schemas.microsoft.com/office/drawing/2014/main" xmlns="" id="{BB65258C-2B3C-2E49-9611-33494A900EFB}"/>
               </a:ext>
             </a:extLst>
           </p:cNvPr>
@@ -8770,7 +8771,7 @@
           <p:cNvPr id="46" name="Multiply 45">
             <a:extLst>
               <a:ext uri="{FF2B5EF4-FFF2-40B4-BE49-F238E27FC236}">
-                <a16:creationId xmlns:a16="http://schemas.microsoft.com/office/drawing/2014/main" id="{E29F4C27-7C1F-4640-B72D-612A66D8AA02}"/>
+                <a16:creationId xmlns:a16="http://schemas.microsoft.com/office/drawing/2014/main" xmlns="" id="{E29F4C27-7C1F-4640-B72D-612A66D8AA02}"/>
               </a:ext>
             </a:extLst>
           </p:cNvPr>
@@ -8828,6 +8829,442 @@
   <p:clrMapOvr>
     <a:masterClrMapping/>
   </p:clrMapOvr>
+  <p:timing>
+    <p:tnLst>
+      <p:par>
+        <p:cTn id="1" dur="indefinite" restart="never" nodeType="tmRoot"/>
+      </p:par>
+    </p:tnLst>
+  </p:timing>
+</p:sld>
+</file>
+
+<file path=ppt/slides/slide2.xml><?xml version="1.0" encoding="utf-8"?>
+<p:sld xmlns:a="http://schemas.openxmlformats.org/drawingml/2006/main" xmlns:r="http://schemas.openxmlformats.org/officeDocument/2006/relationships" xmlns:p="http://schemas.openxmlformats.org/presentationml/2006/main">
+  <p:cSld>
+    <p:spTree>
+      <p:nvGrpSpPr>
+        <p:cNvPr id="1" name=""/>
+        <p:cNvGrpSpPr/>
+        <p:nvPr/>
+      </p:nvGrpSpPr>
+      <p:grpSpPr>
+        <a:xfrm>
+          <a:off x="0" y="0"/>
+          <a:ext cx="0" cy="0"/>
+          <a:chOff x="0" y="0"/>
+          <a:chExt cx="0" cy="0"/>
+        </a:xfrm>
+      </p:grpSpPr>
+      <p:sp>
+        <p:nvSpPr>
+          <p:cNvPr id="2" name="Oval 1">
+            <a:extLst>
+              <a:ext uri="{FF2B5EF4-FFF2-40B4-BE49-F238E27FC236}">
+                <a16:creationId xmlns:a16="http://schemas.microsoft.com/office/drawing/2014/main" xmlns="" id="{AA7A4266-2074-7147-9456-8E60474EB96C}"/>
+              </a:ext>
+            </a:extLst>
+          </p:cNvPr>
+          <p:cNvSpPr/>
+          <p:nvPr/>
+        </p:nvSpPr>
+        <p:spPr>
+          <a:xfrm>
+            <a:off x="7004243" y="4075514"/>
+            <a:ext cx="125434" cy="109123"/>
+          </a:xfrm>
+          <a:prstGeom prst="ellipse">
+            <a:avLst/>
+          </a:prstGeom>
+          <a:solidFill>
+            <a:schemeClr val="bg1"/>
+          </a:solidFill>
+          <a:ln w="19050">
+            <a:solidFill>
+              <a:srgbClr val="0432FF"/>
+            </a:solidFill>
+          </a:ln>
+        </p:spPr>
+        <p:style>
+          <a:lnRef idx="2">
+            <a:schemeClr val="accent1">
+              <a:shade val="50000"/>
+            </a:schemeClr>
+          </a:lnRef>
+          <a:fillRef idx="1">
+            <a:schemeClr val="accent1"/>
+          </a:fillRef>
+          <a:effectRef idx="0">
+            <a:schemeClr val="accent1"/>
+          </a:effectRef>
+          <a:fontRef idx="minor">
+            <a:schemeClr val="lt1"/>
+          </a:fontRef>
+        </p:style>
+        <p:txBody>
+          <a:bodyPr rtlCol="0" anchor="ctr"/>
+          <a:lstStyle/>
+          <a:p>
+            <a:pPr algn="ctr"/>
+            <a:endParaRPr lang="en-US" dirty="0"/>
+          </a:p>
+        </p:txBody>
+      </p:sp>
+      <p:cxnSp>
+        <p:nvCxnSpPr>
+          <p:cNvPr id="4" name="Straight Connector 3"/>
+          <p:cNvCxnSpPr/>
+          <p:nvPr/>
+        </p:nvCxnSpPr>
+        <p:spPr>
+          <a:xfrm>
+            <a:off x="2062716" y="4125433"/>
+            <a:ext cx="531628" cy="0"/>
+          </a:xfrm>
+          <a:prstGeom prst="line">
+            <a:avLst/>
+          </a:prstGeom>
+          <a:ln w="28575">
+            <a:solidFill>
+              <a:schemeClr val="tx1"/>
+            </a:solidFill>
+          </a:ln>
+        </p:spPr>
+        <p:style>
+          <a:lnRef idx="1">
+            <a:schemeClr val="accent1"/>
+          </a:lnRef>
+          <a:fillRef idx="0">
+            <a:schemeClr val="accent1"/>
+          </a:fillRef>
+          <a:effectRef idx="0">
+            <a:schemeClr val="accent1"/>
+          </a:effectRef>
+          <a:fontRef idx="minor">
+            <a:schemeClr val="tx1"/>
+          </a:fontRef>
+        </p:style>
+      </p:cxnSp>
+      <p:sp>
+        <p:nvSpPr>
+          <p:cNvPr id="6" name="TextBox 5"/>
+          <p:cNvSpPr txBox="1"/>
+          <p:nvPr/>
+        </p:nvSpPr>
+        <p:spPr>
+          <a:xfrm>
+            <a:off x="2593476" y="3956156"/>
+            <a:ext cx="863698" cy="338554"/>
+          </a:xfrm>
+          <a:prstGeom prst="rect">
+            <a:avLst/>
+          </a:prstGeom>
+          <a:noFill/>
+        </p:spPr>
+        <p:txBody>
+          <a:bodyPr wrap="none" rtlCol="0">
+            <a:spAutoFit/>
+          </a:bodyPr>
+          <a:lstStyle/>
+          <a:p>
+            <a:r>
+              <a:rPr lang="en-US" sz="1600" dirty="0">
+                <a:latin typeface="Verdana" charset="0"/>
+                <a:ea typeface="Verdana" charset="0"/>
+                <a:cs typeface="Verdana" charset="0"/>
+              </a:rPr>
+              <a:t>T</a:t>
+            </a:r>
+            <a:r>
+              <a:rPr lang="en-US" sz="1600" dirty="0" smtClean="0">
+                <a:latin typeface="Verdana" charset="0"/>
+                <a:ea typeface="Verdana" charset="0"/>
+                <a:cs typeface="Verdana" charset="0"/>
+              </a:rPr>
+              <a:t>ubing</a:t>
+            </a:r>
+            <a:endParaRPr lang="en-US" sz="1600" dirty="0">
+              <a:latin typeface="Verdana" charset="0"/>
+              <a:ea typeface="Verdana" charset="0"/>
+              <a:cs typeface="Verdana" charset="0"/>
+            </a:endParaRPr>
+          </a:p>
+        </p:txBody>
+      </p:sp>
+      <p:cxnSp>
+        <p:nvCxnSpPr>
+          <p:cNvPr id="7" name="Straight Connector 6"/>
+          <p:cNvCxnSpPr/>
+          <p:nvPr/>
+        </p:nvCxnSpPr>
+        <p:spPr>
+          <a:xfrm>
+            <a:off x="3987933" y="4125433"/>
+            <a:ext cx="531628" cy="0"/>
+          </a:xfrm>
+          <a:prstGeom prst="line">
+            <a:avLst/>
+          </a:prstGeom>
+          <a:ln w="28575">
+            <a:solidFill>
+              <a:schemeClr val="tx1"/>
+            </a:solidFill>
+            <a:tailEnd type="triangle" w="lg" len="lg"/>
+          </a:ln>
+        </p:spPr>
+        <p:style>
+          <a:lnRef idx="1">
+            <a:schemeClr val="accent1"/>
+          </a:lnRef>
+          <a:fillRef idx="0">
+            <a:schemeClr val="accent1"/>
+          </a:fillRef>
+          <a:effectRef idx="0">
+            <a:schemeClr val="accent1"/>
+          </a:effectRef>
+          <a:fontRef idx="minor">
+            <a:schemeClr val="tx1"/>
+          </a:fontRef>
+        </p:style>
+      </p:cxnSp>
+      <p:sp>
+        <p:nvSpPr>
+          <p:cNvPr id="8" name="TextBox 7"/>
+          <p:cNvSpPr txBox="1"/>
+          <p:nvPr/>
+        </p:nvSpPr>
+        <p:spPr>
+          <a:xfrm>
+            <a:off x="4519561" y="3956156"/>
+            <a:ext cx="1871025" cy="338554"/>
+          </a:xfrm>
+          <a:prstGeom prst="rect">
+            <a:avLst/>
+          </a:prstGeom>
+          <a:noFill/>
+        </p:spPr>
+        <p:txBody>
+          <a:bodyPr wrap="none" rtlCol="0">
+            <a:spAutoFit/>
+          </a:bodyPr>
+          <a:lstStyle/>
+          <a:p>
+            <a:r>
+              <a:rPr lang="en-US" sz="1600" dirty="0" smtClean="0">
+                <a:latin typeface="Verdana" charset="0"/>
+                <a:ea typeface="Verdana" charset="0"/>
+                <a:cs typeface="Verdana" charset="0"/>
+              </a:rPr>
+              <a:t>Direction of flow</a:t>
+            </a:r>
+            <a:endParaRPr lang="en-US" sz="1600" dirty="0">
+              <a:latin typeface="Verdana" charset="0"/>
+              <a:ea typeface="Verdana" charset="0"/>
+              <a:cs typeface="Verdana" charset="0"/>
+            </a:endParaRPr>
+          </a:p>
+        </p:txBody>
+      </p:sp>
+      <p:sp>
+        <p:nvSpPr>
+          <p:cNvPr id="9" name="TextBox 8"/>
+          <p:cNvSpPr txBox="1"/>
+          <p:nvPr/>
+        </p:nvSpPr>
+        <p:spPr>
+          <a:xfrm>
+            <a:off x="7135653" y="3960798"/>
+            <a:ext cx="1338059" cy="338554"/>
+          </a:xfrm>
+          <a:prstGeom prst="rect">
+            <a:avLst/>
+          </a:prstGeom>
+          <a:noFill/>
+        </p:spPr>
+        <p:txBody>
+          <a:bodyPr wrap="none" rtlCol="0">
+            <a:spAutoFit/>
+          </a:bodyPr>
+          <a:lstStyle/>
+          <a:p>
+            <a:r>
+              <a:rPr lang="en-US" sz="1600" dirty="0" smtClean="0">
+                <a:latin typeface="Verdana" charset="0"/>
+                <a:ea typeface="Verdana" charset="0"/>
+                <a:cs typeface="Verdana" charset="0"/>
+              </a:rPr>
+              <a:t>Open valve</a:t>
+            </a:r>
+            <a:endParaRPr lang="en-US" sz="1600" dirty="0">
+              <a:latin typeface="Verdana" charset="0"/>
+              <a:ea typeface="Verdana" charset="0"/>
+              <a:cs typeface="Verdana" charset="0"/>
+            </a:endParaRPr>
+          </a:p>
+        </p:txBody>
+      </p:sp>
+      <p:sp>
+        <p:nvSpPr>
+          <p:cNvPr id="10" name="Oval 9">
+            <a:extLst>
+              <a:ext uri="{FF2B5EF4-FFF2-40B4-BE49-F238E27FC236}">
+                <a16:creationId xmlns:a16="http://schemas.microsoft.com/office/drawing/2014/main" xmlns="" id="{AA7A4266-2074-7147-9456-8E60474EB96C}"/>
+              </a:ext>
+            </a:extLst>
+          </p:cNvPr>
+          <p:cNvSpPr/>
+          <p:nvPr/>
+        </p:nvSpPr>
+        <p:spPr>
+          <a:xfrm>
+            <a:off x="9087369" y="4070872"/>
+            <a:ext cx="125434" cy="109123"/>
+          </a:xfrm>
+          <a:prstGeom prst="ellipse">
+            <a:avLst/>
+          </a:prstGeom>
+          <a:solidFill>
+            <a:schemeClr val="bg1"/>
+          </a:solidFill>
+          <a:ln w="19050">
+            <a:solidFill>
+              <a:srgbClr val="0432FF"/>
+            </a:solidFill>
+          </a:ln>
+        </p:spPr>
+        <p:style>
+          <a:lnRef idx="2">
+            <a:schemeClr val="accent1">
+              <a:shade val="50000"/>
+            </a:schemeClr>
+          </a:lnRef>
+          <a:fillRef idx="1">
+            <a:schemeClr val="accent1"/>
+          </a:fillRef>
+          <a:effectRef idx="0">
+            <a:schemeClr val="accent1"/>
+          </a:effectRef>
+          <a:fontRef idx="minor">
+            <a:schemeClr val="lt1"/>
+          </a:fontRef>
+        </p:style>
+        <p:txBody>
+          <a:bodyPr rtlCol="0" anchor="ctr"/>
+          <a:lstStyle/>
+          <a:p>
+            <a:pPr algn="ctr"/>
+            <a:endParaRPr lang="en-US" dirty="0"/>
+          </a:p>
+        </p:txBody>
+      </p:sp>
+      <p:sp>
+        <p:nvSpPr>
+          <p:cNvPr id="11" name="TextBox 10"/>
+          <p:cNvSpPr txBox="1"/>
+          <p:nvPr/>
+        </p:nvSpPr>
+        <p:spPr>
+          <a:xfrm>
+            <a:off x="9218779" y="3956156"/>
+            <a:ext cx="1477520" cy="338554"/>
+          </a:xfrm>
+          <a:prstGeom prst="rect">
+            <a:avLst/>
+          </a:prstGeom>
+          <a:noFill/>
+        </p:spPr>
+        <p:txBody>
+          <a:bodyPr wrap="none" rtlCol="0">
+            <a:spAutoFit/>
+          </a:bodyPr>
+          <a:lstStyle/>
+          <a:p>
+            <a:r>
+              <a:rPr lang="en-US" sz="1600" dirty="0" smtClean="0">
+                <a:latin typeface="Verdana" charset="0"/>
+                <a:ea typeface="Verdana" charset="0"/>
+                <a:cs typeface="Verdana" charset="0"/>
+              </a:rPr>
+              <a:t>Closed valve</a:t>
+            </a:r>
+            <a:endParaRPr lang="en-US" sz="1600" dirty="0">
+              <a:latin typeface="Verdana" charset="0"/>
+              <a:ea typeface="Verdana" charset="0"/>
+              <a:cs typeface="Verdana" charset="0"/>
+            </a:endParaRPr>
+          </a:p>
+        </p:txBody>
+      </p:sp>
+      <p:sp>
+        <p:nvSpPr>
+          <p:cNvPr id="12" name="Multiply 11">
+            <a:extLst>
+              <a:ext uri="{FF2B5EF4-FFF2-40B4-BE49-F238E27FC236}">
+                <a16:creationId xmlns:a16="http://schemas.microsoft.com/office/drawing/2014/main" xmlns="" id="{E29F4C27-7C1F-4640-B72D-612A66D8AA02}"/>
+              </a:ext>
+            </a:extLst>
+          </p:cNvPr>
+          <p:cNvSpPr/>
+          <p:nvPr/>
+        </p:nvSpPr>
+        <p:spPr>
+          <a:xfrm>
+            <a:off x="9077418" y="4059903"/>
+            <a:ext cx="138373" cy="136532"/>
+          </a:xfrm>
+          <a:prstGeom prst="mathMultiply">
+            <a:avLst>
+              <a:gd name="adj1" fmla="val 7109"/>
+            </a:avLst>
+          </a:prstGeom>
+          <a:ln w="9525">
+            <a:solidFill>
+              <a:srgbClr val="FF0000"/>
+            </a:solidFill>
+          </a:ln>
+        </p:spPr>
+        <p:style>
+          <a:lnRef idx="2">
+            <a:schemeClr val="accent1">
+              <a:shade val="50000"/>
+            </a:schemeClr>
+          </a:lnRef>
+          <a:fillRef idx="1">
+            <a:schemeClr val="accent1"/>
+          </a:fillRef>
+          <a:effectRef idx="0">
+            <a:schemeClr val="accent1"/>
+          </a:effectRef>
+          <a:fontRef idx="minor">
+            <a:schemeClr val="lt1"/>
+          </a:fontRef>
+        </p:style>
+        <p:txBody>
+          <a:bodyPr rtlCol="0" anchor="ctr"/>
+          <a:lstStyle/>
+          <a:p>
+            <a:pPr algn="ctr"/>
+            <a:endParaRPr lang="en-US" dirty="0"/>
+          </a:p>
+        </p:txBody>
+      </p:sp>
+    </p:spTree>
+    <p:extLst>
+      <p:ext uri="{BB962C8B-B14F-4D97-AF65-F5344CB8AC3E}">
+        <p14:creationId xmlns:p14="http://schemas.microsoft.com/office/powerpoint/2010/main" val="444019744"/>
+      </p:ext>
+    </p:extLst>
+  </p:cSld>
+  <p:clrMapOvr>
+    <a:masterClrMapping/>
+  </p:clrMapOvr>
+  <p:timing>
+    <p:tnLst>
+      <p:par>
+        <p:cTn id="1" dur="indefinite" restart="never" nodeType="tmRoot"/>
+      </p:par>
+    </p:tnLst>
+  </p:timing>
 </p:sld>
 </file>
 

</xml_diff>